<commit_message>
Update presentation slide and ratio in ploynomial regression.
</commit_message>
<xml_diff>
--- a/Presentation.pptx
+++ b/Presentation.pptx
@@ -17,13 +17,15 @@
     <p:sldId id="272" r:id="rId11"/>
     <p:sldId id="266" r:id="rId12"/>
     <p:sldId id="273" r:id="rId13"/>
-    <p:sldId id="264" r:id="rId14"/>
-    <p:sldId id="269" r:id="rId15"/>
-    <p:sldId id="281" r:id="rId16"/>
-    <p:sldId id="262" r:id="rId17"/>
-    <p:sldId id="282" r:id="rId18"/>
-    <p:sldId id="258" r:id="rId19"/>
-    <p:sldId id="278" r:id="rId20"/>
+    <p:sldId id="283" r:id="rId14"/>
+    <p:sldId id="264" r:id="rId15"/>
+    <p:sldId id="284" r:id="rId16"/>
+    <p:sldId id="269" r:id="rId17"/>
+    <p:sldId id="281" r:id="rId18"/>
+    <p:sldId id="262" r:id="rId19"/>
+    <p:sldId id="282" r:id="rId20"/>
+    <p:sldId id="258" r:id="rId21"/>
+    <p:sldId id="278" r:id="rId22"/>
   </p:sldIdLst>
   <p:sldSz cx="12192000" cy="6858000"/>
   <p:notesSz cx="6858000" cy="9144000"/>
@@ -155,75 +157,7 @@
     </mc:Fallback>
   </mc:AlternateContent>
   <c:chart>
-    <c:title>
-      <c:tx>
-        <c:rich>
-          <a:bodyPr rot="0" spcFirstLastPara="1" vertOverflow="ellipsis" vert="horz" wrap="square" anchor="ctr" anchorCtr="1"/>
-          <a:lstStyle/>
-          <a:p>
-            <a:pPr>
-              <a:defRPr sz="1862" b="0" i="0" u="none" strike="noStrike" kern="1200" spc="0" baseline="0">
-                <a:solidFill>
-                  <a:schemeClr val="tx1">
-                    <a:lumMod val="65000"/>
-                    <a:lumOff val="35000"/>
-                  </a:schemeClr>
-                </a:solidFill>
-                <a:latin typeface="+mn-lt"/>
-                <a:ea typeface="+mn-ea"/>
-                <a:cs typeface="+mn-cs"/>
-              </a:defRPr>
-            </a:pPr>
-            <a:r>
-              <a:rPr lang="en-US" dirty="0"/>
-              <a:t>Sample</a:t>
-            </a:r>
-            <a:r>
-              <a:rPr lang="en-US" baseline="0" dirty="0"/>
-              <a:t> of some province </a:t>
-            </a:r>
-            <a:r>
-              <a:rPr lang="en-US" dirty="0"/>
-              <a:t>Patient</a:t>
-            </a:r>
-            <a:r>
-              <a:rPr lang="en-US" baseline="0" dirty="0"/>
-              <a:t> and Rainfall</a:t>
-            </a:r>
-            <a:endParaRPr lang="en-US" dirty="0"/>
-          </a:p>
-        </c:rich>
-      </c:tx>
-      <c:overlay val="0"/>
-      <c:spPr>
-        <a:noFill/>
-        <a:ln>
-          <a:noFill/>
-        </a:ln>
-        <a:effectLst/>
-      </c:spPr>
-      <c:txPr>
-        <a:bodyPr rot="0" spcFirstLastPara="1" vertOverflow="ellipsis" vert="horz" wrap="square" anchor="ctr" anchorCtr="1"/>
-        <a:lstStyle/>
-        <a:p>
-          <a:pPr>
-            <a:defRPr sz="1862" b="0" i="0" u="none" strike="noStrike" kern="1200" spc="0" baseline="0">
-              <a:solidFill>
-                <a:schemeClr val="tx1">
-                  <a:lumMod val="65000"/>
-                  <a:lumOff val="35000"/>
-                </a:schemeClr>
-              </a:solidFill>
-              <a:latin typeface="+mn-lt"/>
-              <a:ea typeface="+mn-ea"/>
-              <a:cs typeface="+mn-cs"/>
-            </a:defRPr>
-          </a:pPr>
-          <a:endParaRPr lang="en-US"/>
-        </a:p>
-      </c:txPr>
-    </c:title>
-    <c:autoTitleDeleted val="0"/>
+    <c:autoTitleDeleted val="1"/>
     <c:plotArea>
       <c:layout/>
       <c:barChart>
@@ -232,21 +166,24 @@
         <c:varyColors val="0"/>
         <c:ser>
           <c:idx val="1"/>
-          <c:order val="0"/>
+          <c:order val="1"/>
           <c:tx>
             <c:strRef>
-              <c:f>Sheet1!$C$1</c:f>
+              <c:f>Sheet2!$C$1</c:f>
               <c:strCache>
                 <c:ptCount val="1"/>
                 <c:pt idx="0">
-                  <c:v>Rain</c:v>
+                  <c:v>Patient</c:v>
                 </c:pt>
               </c:strCache>
             </c:strRef>
           </c:tx>
           <c:spPr>
             <a:solidFill>
-              <a:schemeClr val="accent2"/>
+              <a:schemeClr val="tx1">
+                <a:lumMod val="50000"/>
+                <a:lumOff val="50000"/>
+              </a:schemeClr>
             </a:solidFill>
             <a:ln>
               <a:noFill/>
@@ -256,48 +193,54 @@
           <c:invertIfNegative val="0"/>
           <c:cat>
             <c:strRef>
-              <c:f>Sheet1!$A$2:$A$5</c:f>
+              <c:f>Sheet2!$A$2:$A$6</c:f>
               <c:strCache>
-                <c:ptCount val="4"/>
+                <c:ptCount val="5"/>
                 <c:pt idx="0">
-                  <c:v>June</c:v>
+                  <c:v>Nakornrachasima</c:v>
                 </c:pt>
                 <c:pt idx="1">
-                  <c:v>August</c:v>
+                  <c:v>Konkean</c:v>
                 </c:pt>
                 <c:pt idx="2">
-                  <c:v>September</c:v>
+                  <c:v>Trang</c:v>
                 </c:pt>
                 <c:pt idx="3">
-                  <c:v>October</c:v>
+                  <c:v>Mahasarakarm</c:v>
+                </c:pt>
+                <c:pt idx="4">
+                  <c:v>Puket</c:v>
                 </c:pt>
               </c:strCache>
             </c:strRef>
           </c:cat>
           <c:val>
             <c:numRef>
-              <c:f>Sheet1!$C$2:$C$5</c:f>
+              <c:f>Sheet2!$C$2:$C$6</c:f>
               <c:numCache>
                 <c:formatCode>General</c:formatCode>
-                <c:ptCount val="4"/>
+                <c:ptCount val="5"/>
                 <c:pt idx="0">
-                  <c:v>2.4</c:v>
+                  <c:v>6991</c:v>
                 </c:pt>
                 <c:pt idx="1">
-                  <c:v>2</c:v>
+                  <c:v>4595</c:v>
                 </c:pt>
                 <c:pt idx="2">
-                  <c:v>4</c:v>
+                  <c:v>3211</c:v>
                 </c:pt>
                 <c:pt idx="3">
-                  <c:v>5</c:v>
+                  <c:v>2509</c:v>
+                </c:pt>
+                <c:pt idx="4">
+                  <c:v>510</c:v>
                 </c:pt>
               </c:numCache>
             </c:numRef>
           </c:val>
           <c:extLst>
             <c:ext xmlns:c16="http://schemas.microsoft.com/office/drawing/2014/chart" uri="{C3380CC4-5D6E-409C-BE32-E72D297353CC}">
-              <c16:uniqueId val="{00000001-41A1-4383-A2A9-F0CEF9BB44DF}"/>
+              <c16:uniqueId val="{00000000-6F55-4CE4-8994-12EE33695E5E}"/>
             </c:ext>
           </c:extLst>
         </c:ser>
@@ -310,23 +253,22 @@
           <c:showBubbleSize val="0"/>
         </c:dLbls>
         <c:gapWidth val="219"/>
-        <c:overlap val="-27"/>
-        <c:axId val="614788192"/>
-        <c:axId val="614791104"/>
+        <c:axId val="1740297599"/>
+        <c:axId val="1740298431"/>
       </c:barChart>
       <c:lineChart>
         <c:grouping val="standard"/>
         <c:varyColors val="0"/>
         <c:ser>
-          <c:idx val="2"/>
-          <c:order val="1"/>
+          <c:idx val="0"/>
+          <c:order val="0"/>
           <c:tx>
             <c:strRef>
-              <c:f>Sheet1!$D$1</c:f>
+              <c:f>Sheet2!$B$1</c:f>
               <c:strCache>
                 <c:ptCount val="1"/>
                 <c:pt idx="0">
-                  <c:v>Patient</c:v>
+                  <c:v>Rainfall</c:v>
                 </c:pt>
               </c:strCache>
             </c:strRef>
@@ -334,7 +276,7 @@
           <c:spPr>
             <a:ln w="28575" cap="rnd">
               <a:solidFill>
-                <a:srgbClr val="FF0066"/>
+                <a:schemeClr val="accent1"/>
               </a:solidFill>
               <a:round/>
             </a:ln>
@@ -345,41 +287,47 @@
           </c:marker>
           <c:cat>
             <c:strRef>
-              <c:f>Sheet1!$A$2:$A$5</c:f>
+              <c:f>Sheet2!$A$2:$A$6</c:f>
               <c:strCache>
-                <c:ptCount val="4"/>
+                <c:ptCount val="5"/>
                 <c:pt idx="0">
-                  <c:v>June</c:v>
+                  <c:v>Nakornrachasima</c:v>
                 </c:pt>
                 <c:pt idx="1">
-                  <c:v>August</c:v>
+                  <c:v>Konkean</c:v>
                 </c:pt>
                 <c:pt idx="2">
-                  <c:v>September</c:v>
+                  <c:v>Trang</c:v>
                 </c:pt>
                 <c:pt idx="3">
-                  <c:v>October</c:v>
+                  <c:v>Mahasarakarm</c:v>
+                </c:pt>
+                <c:pt idx="4">
+                  <c:v>Puket</c:v>
                 </c:pt>
               </c:strCache>
             </c:strRef>
           </c:cat>
           <c:val>
             <c:numRef>
-              <c:f>Sheet1!$D$2:$D$5</c:f>
+              <c:f>Sheet2!$B$2:$B$6</c:f>
               <c:numCache>
                 <c:formatCode>General</c:formatCode>
-                <c:ptCount val="4"/>
+                <c:ptCount val="5"/>
                 <c:pt idx="0">
-                  <c:v>2</c:v>
+                  <c:v>114</c:v>
                 </c:pt>
                 <c:pt idx="1">
-                  <c:v>3</c:v>
+                  <c:v>110</c:v>
                 </c:pt>
                 <c:pt idx="2">
-                  <c:v>3.5</c:v>
+                  <c:v>192</c:v>
                 </c:pt>
                 <c:pt idx="3">
-                  <c:v>5</c:v>
+                  <c:v>98</c:v>
+                </c:pt>
+                <c:pt idx="4">
+                  <c:v>178</c:v>
                 </c:pt>
               </c:numCache>
             </c:numRef>
@@ -387,7 +335,7 @@
           <c:smooth val="0"/>
           <c:extLst>
             <c:ext xmlns:c16="http://schemas.microsoft.com/office/drawing/2014/chart" uri="{C3380CC4-5D6E-409C-BE32-E72D297353CC}">
-              <c16:uniqueId val="{00000002-41A1-4383-A2A9-F0CEF9BB44DF}"/>
+              <c16:uniqueId val="{00000001-6F55-4CE4-8994-12EE33695E5E}"/>
             </c:ext>
           </c:extLst>
         </c:ser>
@@ -401,11 +349,11 @@
         </c:dLbls>
         <c:marker val="1"/>
         <c:smooth val="0"/>
-        <c:axId val="614788192"/>
-        <c:axId val="614791104"/>
+        <c:axId val="1934279039"/>
+        <c:axId val="1809049503"/>
       </c:lineChart>
       <c:catAx>
-        <c:axId val="614788192"/>
+        <c:axId val="1740297599"/>
         <c:scaling>
           <c:orientation val="minMax"/>
         </c:scaling>
@@ -433,12 +381,9 @@
           <a:lstStyle/>
           <a:p>
             <a:pPr>
-              <a:defRPr sz="1197" b="0" i="0" u="none" strike="noStrike" kern="1200" baseline="0">
+              <a:defRPr sz="1600" b="0" i="0" u="none" strike="noStrike" kern="1200" baseline="0">
                 <a:solidFill>
-                  <a:schemeClr val="tx1">
-                    <a:lumMod val="65000"/>
-                    <a:lumOff val="35000"/>
-                  </a:schemeClr>
+                  <a:schemeClr val="tx1"/>
                 </a:solidFill>
                 <a:latin typeface="+mn-lt"/>
                 <a:ea typeface="+mn-ea"/>
@@ -448,7 +393,7 @@
             <a:endParaRPr lang="en-US"/>
           </a:p>
         </c:txPr>
-        <c:crossAx val="614791104"/>
+        <c:crossAx val="1740298431"/>
         <c:crosses val="autoZero"/>
         <c:auto val="1"/>
         <c:lblAlgn val="ctr"/>
@@ -456,7 +401,7 @@
         <c:noMultiLvlLbl val="0"/>
       </c:catAx>
       <c:valAx>
-        <c:axId val="614791104"/>
+        <c:axId val="1740298431"/>
         <c:scaling>
           <c:orientation val="minMax"/>
         </c:scaling>
@@ -492,12 +437,9 @@
           <a:lstStyle/>
           <a:p>
             <a:pPr>
-              <a:defRPr sz="1197" b="0" i="0" u="none" strike="noStrike" kern="1200" baseline="0">
+              <a:defRPr sz="1600" b="0" i="0" u="none" strike="noStrike" kern="1200" baseline="0">
                 <a:solidFill>
-                  <a:schemeClr val="tx1">
-                    <a:lumMod val="65000"/>
-                    <a:lumOff val="35000"/>
-                  </a:schemeClr>
+                  <a:schemeClr val="tx1"/>
                 </a:solidFill>
                 <a:latin typeface="+mn-lt"/>
                 <a:ea typeface="+mn-ea"/>
@@ -507,10 +449,67 @@
             <a:endParaRPr lang="en-US"/>
           </a:p>
         </c:txPr>
-        <c:crossAx val="614788192"/>
+        <c:crossAx val="1740297599"/>
         <c:crosses val="autoZero"/>
         <c:crossBetween val="between"/>
       </c:valAx>
+      <c:valAx>
+        <c:axId val="1809049503"/>
+        <c:scaling>
+          <c:orientation val="minMax"/>
+        </c:scaling>
+        <c:delete val="0"/>
+        <c:axPos val="r"/>
+        <c:numFmt formatCode="General" sourceLinked="1"/>
+        <c:majorTickMark val="out"/>
+        <c:minorTickMark val="none"/>
+        <c:tickLblPos val="nextTo"/>
+        <c:spPr>
+          <a:noFill/>
+          <a:ln>
+            <a:noFill/>
+          </a:ln>
+          <a:effectLst/>
+        </c:spPr>
+        <c:txPr>
+          <a:bodyPr rot="-60000000" spcFirstLastPara="1" vertOverflow="ellipsis" vert="horz" wrap="square" anchor="ctr" anchorCtr="1"/>
+          <a:lstStyle/>
+          <a:p>
+            <a:pPr>
+              <a:defRPr sz="1600" b="0" i="0" u="none" strike="noStrike" kern="1200" baseline="0">
+                <a:solidFill>
+                  <a:schemeClr val="tx1"/>
+                </a:solidFill>
+                <a:latin typeface="+mn-lt"/>
+                <a:ea typeface="+mn-ea"/>
+                <a:cs typeface="+mn-cs"/>
+              </a:defRPr>
+            </a:pPr>
+            <a:endParaRPr lang="en-US"/>
+          </a:p>
+        </c:txPr>
+        <c:crossAx val="1934279039"/>
+        <c:crosses val="max"/>
+        <c:crossBetween val="between"/>
+      </c:valAx>
+      <c:catAx>
+        <c:axId val="1934279039"/>
+        <c:scaling>
+          <c:orientation val="minMax"/>
+        </c:scaling>
+        <c:delete val="1"/>
+        <c:axPos val="b"/>
+        <c:numFmt formatCode="General" sourceLinked="1"/>
+        <c:majorTickMark val="out"/>
+        <c:minorTickMark val="none"/>
+        <c:tickLblPos val="nextTo"/>
+        <c:crossAx val="1809049503"/>
+        <c:crosses val="autoZero"/>
+        <c:auto val="1"/>
+        <c:lblAlgn val="ctr"/>
+        <c:lblOffset val="100"/>
+        <c:noMultiLvlLbl val="0"/>
+      </c:catAx>
       <c:spPr>
         <a:noFill/>
         <a:ln>
@@ -534,12 +533,9 @@
         <a:lstStyle/>
         <a:p>
           <a:pPr>
-            <a:defRPr sz="1197" b="0" i="0" u="none" strike="noStrike" kern="1200" baseline="0">
+            <a:defRPr sz="1600" b="0" i="0" u="none" strike="noStrike" kern="1200" baseline="0">
               <a:solidFill>
-                <a:schemeClr val="tx1">
-                  <a:lumMod val="65000"/>
-                  <a:lumOff val="35000"/>
-                </a:schemeClr>
+                <a:schemeClr val="tx1"/>
               </a:solidFill>
               <a:latin typeface="+mn-lt"/>
               <a:ea typeface="+mn-ea"/>
@@ -573,442 +569,11 @@
     <a:lstStyle/>
     <a:p>
       <a:pPr>
-        <a:defRPr/>
-      </a:pPr>
-      <a:endParaRPr lang="en-US"/>
-    </a:p>
-  </c:txPr>
-  <c:externalData r:id="rId3">
-    <c:autoUpdate val="0"/>
-  </c:externalData>
-</c:chartSpace>
-</file>
-
-<file path=ppt/charts/chart2.xml><?xml version="1.0" encoding="utf-8"?>
-<c:chartSpace xmlns:c="http://schemas.openxmlformats.org/drawingml/2006/chart" xmlns:a="http://schemas.openxmlformats.org/drawingml/2006/main" xmlns:r="http://schemas.openxmlformats.org/officeDocument/2006/relationships" xmlns:c16r2="http://schemas.microsoft.com/office/drawing/2015/06/chart">
-  <c:date1904 val="0"/>
-  <c:lang val="en-US"/>
-  <c:roundedCorners val="0"/>
-  <mc:AlternateContent xmlns:mc="http://schemas.openxmlformats.org/markup-compatibility/2006">
-    <mc:Choice xmlns:c14="http://schemas.microsoft.com/office/drawing/2007/8/2/chart" Requires="c14">
-      <c14:style val="102"/>
-    </mc:Choice>
-    <mc:Fallback>
-      <c:style val="2"/>
-    </mc:Fallback>
-  </mc:AlternateContent>
-  <c:chart>
-    <c:title>
-      <c:tx>
-        <c:rich>
-          <a:bodyPr rot="0" spcFirstLastPara="1" vertOverflow="ellipsis" vert="horz" wrap="square" anchor="ctr" anchorCtr="1"/>
-          <a:lstStyle/>
-          <a:p>
-            <a:pPr>
-              <a:defRPr sz="1862" b="0" i="0" u="none" strike="noStrike" kern="1200" spc="0" baseline="0">
-                <a:solidFill>
-                  <a:schemeClr val="tx1">
-                    <a:lumMod val="65000"/>
-                    <a:lumOff val="35000"/>
-                  </a:schemeClr>
-                </a:solidFill>
-                <a:latin typeface="+mn-lt"/>
-                <a:ea typeface="+mn-ea"/>
-                <a:cs typeface="+mn-cs"/>
-              </a:defRPr>
-            </a:pPr>
-            <a:r>
-              <a:rPr lang="th-TH" dirty="0"/>
-              <a:t>แสดงกราฟของจังหวัดที่</a:t>
-            </a:r>
-            <a:r>
-              <a:rPr lang="th-TH" baseline="0" dirty="0"/>
-              <a:t> จำนวนผู้ป่วย ไม่สอดคล้องกับ ปริมาณน้ำฝน</a:t>
-            </a:r>
-            <a:endParaRPr lang="en-US" dirty="0"/>
-          </a:p>
-        </c:rich>
-      </c:tx>
-      <c:overlay val="0"/>
-      <c:spPr>
-        <a:noFill/>
-        <a:ln>
-          <a:noFill/>
-        </a:ln>
-        <a:effectLst/>
-      </c:spPr>
-      <c:txPr>
-        <a:bodyPr rot="0" spcFirstLastPara="1" vertOverflow="ellipsis" vert="horz" wrap="square" anchor="ctr" anchorCtr="1"/>
-        <a:lstStyle/>
-        <a:p>
-          <a:pPr>
-            <a:defRPr sz="1862" b="0" i="0" u="none" strike="noStrike" kern="1200" spc="0" baseline="0">
-              <a:solidFill>
-                <a:schemeClr val="tx1">
-                  <a:lumMod val="65000"/>
-                  <a:lumOff val="35000"/>
-                </a:schemeClr>
-              </a:solidFill>
-              <a:latin typeface="+mn-lt"/>
-              <a:ea typeface="+mn-ea"/>
-              <a:cs typeface="+mn-cs"/>
-            </a:defRPr>
-          </a:pPr>
-          <a:endParaRPr lang="en-US"/>
-        </a:p>
-      </c:txPr>
-    </c:title>
-    <c:autoTitleDeleted val="0"/>
-    <c:plotArea>
-      <c:layout/>
-      <c:barChart>
-        <c:barDir val="col"/>
-        <c:grouping val="clustered"/>
-        <c:varyColors val="0"/>
-        <c:ser>
-          <c:idx val="1"/>
-          <c:order val="0"/>
-          <c:tx>
-            <c:strRef>
-              <c:f>Sheet1!$C$1</c:f>
-              <c:strCache>
-                <c:ptCount val="1"/>
-                <c:pt idx="0">
-                  <c:v>Rain</c:v>
-                </c:pt>
-              </c:strCache>
-            </c:strRef>
-          </c:tx>
-          <c:spPr>
-            <a:solidFill>
-              <a:schemeClr val="accent2"/>
-            </a:solidFill>
-            <a:ln>
-              <a:noFill/>
-            </a:ln>
-            <a:effectLst/>
-          </c:spPr>
-          <c:invertIfNegative val="0"/>
-          <c:cat>
-            <c:strRef>
-              <c:f>Sheet1!$A$2:$A$5</c:f>
-              <c:strCache>
-                <c:ptCount val="4"/>
-                <c:pt idx="0">
-                  <c:v>June</c:v>
-                </c:pt>
-                <c:pt idx="1">
-                  <c:v>August</c:v>
-                </c:pt>
-                <c:pt idx="2">
-                  <c:v>September</c:v>
-                </c:pt>
-                <c:pt idx="3">
-                  <c:v>October</c:v>
-                </c:pt>
-              </c:strCache>
-            </c:strRef>
-          </c:cat>
-          <c:val>
-            <c:numRef>
-              <c:f>Sheet1!$C$2:$C$5</c:f>
-              <c:numCache>
-                <c:formatCode>General</c:formatCode>
-                <c:ptCount val="4"/>
-                <c:pt idx="0">
-                  <c:v>2.4</c:v>
-                </c:pt>
-                <c:pt idx="1">
-                  <c:v>2</c:v>
-                </c:pt>
-                <c:pt idx="2">
-                  <c:v>4</c:v>
-                </c:pt>
-                <c:pt idx="3">
-                  <c:v>5</c:v>
-                </c:pt>
-              </c:numCache>
-            </c:numRef>
-          </c:val>
-          <c:extLst>
-            <c:ext xmlns:c16="http://schemas.microsoft.com/office/drawing/2014/chart" uri="{C3380CC4-5D6E-409C-BE32-E72D297353CC}">
-              <c16:uniqueId val="{00000001-41A1-4383-A2A9-F0CEF9BB44DF}"/>
-            </c:ext>
-          </c:extLst>
-        </c:ser>
-        <c:dLbls>
-          <c:showLegendKey val="0"/>
-          <c:showVal val="0"/>
-          <c:showCatName val="0"/>
-          <c:showSerName val="0"/>
-          <c:showPercent val="0"/>
-          <c:showBubbleSize val="0"/>
-        </c:dLbls>
-        <c:gapWidth val="219"/>
-        <c:overlap val="-27"/>
-        <c:axId val="614788192"/>
-        <c:axId val="614791104"/>
-      </c:barChart>
-      <c:lineChart>
-        <c:grouping val="standard"/>
-        <c:varyColors val="0"/>
-        <c:ser>
-          <c:idx val="2"/>
-          <c:order val="1"/>
-          <c:tx>
-            <c:strRef>
-              <c:f>Sheet1!$D$1</c:f>
-              <c:strCache>
-                <c:ptCount val="1"/>
-                <c:pt idx="0">
-                  <c:v>Patient</c:v>
-                </c:pt>
-              </c:strCache>
-            </c:strRef>
-          </c:tx>
-          <c:spPr>
-            <a:ln w="28575" cap="rnd">
-              <a:solidFill>
-                <a:srgbClr val="FF0066"/>
-              </a:solidFill>
-              <a:round/>
-            </a:ln>
-            <a:effectLst/>
-          </c:spPr>
-          <c:marker>
-            <c:symbol val="none"/>
-          </c:marker>
-          <c:cat>
-            <c:strRef>
-              <c:f>Sheet1!$A$2:$A$5</c:f>
-              <c:strCache>
-                <c:ptCount val="4"/>
-                <c:pt idx="0">
-                  <c:v>June</c:v>
-                </c:pt>
-                <c:pt idx="1">
-                  <c:v>August</c:v>
-                </c:pt>
-                <c:pt idx="2">
-                  <c:v>September</c:v>
-                </c:pt>
-                <c:pt idx="3">
-                  <c:v>October</c:v>
-                </c:pt>
-              </c:strCache>
-            </c:strRef>
-          </c:cat>
-          <c:val>
-            <c:numRef>
-              <c:f>Sheet1!$D$2:$D$5</c:f>
-              <c:numCache>
-                <c:formatCode>General</c:formatCode>
-                <c:ptCount val="4"/>
-                <c:pt idx="0">
-                  <c:v>2</c:v>
-                </c:pt>
-                <c:pt idx="1">
-                  <c:v>3</c:v>
-                </c:pt>
-                <c:pt idx="2">
-                  <c:v>3.5</c:v>
-                </c:pt>
-                <c:pt idx="3">
-                  <c:v>5</c:v>
-                </c:pt>
-              </c:numCache>
-            </c:numRef>
-          </c:val>
-          <c:smooth val="0"/>
-          <c:extLst>
-            <c:ext xmlns:c16="http://schemas.microsoft.com/office/drawing/2014/chart" uri="{C3380CC4-5D6E-409C-BE32-E72D297353CC}">
-              <c16:uniqueId val="{00000002-41A1-4383-A2A9-F0CEF9BB44DF}"/>
-            </c:ext>
-          </c:extLst>
-        </c:ser>
-        <c:dLbls>
-          <c:showLegendKey val="0"/>
-          <c:showVal val="0"/>
-          <c:showCatName val="0"/>
-          <c:showSerName val="0"/>
-          <c:showPercent val="0"/>
-          <c:showBubbleSize val="0"/>
-        </c:dLbls>
-        <c:marker val="1"/>
-        <c:smooth val="0"/>
-        <c:axId val="614788192"/>
-        <c:axId val="614791104"/>
-      </c:lineChart>
-      <c:catAx>
-        <c:axId val="614788192"/>
-        <c:scaling>
-          <c:orientation val="minMax"/>
-        </c:scaling>
-        <c:delete val="0"/>
-        <c:axPos val="b"/>
-        <c:numFmt formatCode="General" sourceLinked="1"/>
-        <c:majorTickMark val="none"/>
-        <c:minorTickMark val="none"/>
-        <c:tickLblPos val="nextTo"/>
-        <c:spPr>
-          <a:noFill/>
-          <a:ln w="9525" cap="flat" cmpd="sng" algn="ctr">
-            <a:solidFill>
-              <a:schemeClr val="tx1">
-                <a:lumMod val="15000"/>
-                <a:lumOff val="85000"/>
-              </a:schemeClr>
-            </a:solidFill>
-            <a:round/>
-          </a:ln>
-          <a:effectLst/>
-        </c:spPr>
-        <c:txPr>
-          <a:bodyPr rot="-60000000" spcFirstLastPara="1" vertOverflow="ellipsis" vert="horz" wrap="square" anchor="ctr" anchorCtr="1"/>
-          <a:lstStyle/>
-          <a:p>
-            <a:pPr>
-              <a:defRPr sz="1197" b="0" i="0" u="none" strike="noStrike" kern="1200" baseline="0">
-                <a:solidFill>
-                  <a:schemeClr val="tx1">
-                    <a:lumMod val="65000"/>
-                    <a:lumOff val="35000"/>
-                  </a:schemeClr>
-                </a:solidFill>
-                <a:latin typeface="+mn-lt"/>
-                <a:ea typeface="+mn-ea"/>
-                <a:cs typeface="+mn-cs"/>
-              </a:defRPr>
-            </a:pPr>
-            <a:endParaRPr lang="en-US"/>
-          </a:p>
-        </c:txPr>
-        <c:crossAx val="614791104"/>
-        <c:crosses val="autoZero"/>
-        <c:auto val="1"/>
-        <c:lblAlgn val="ctr"/>
-        <c:lblOffset val="100"/>
-        <c:noMultiLvlLbl val="0"/>
-      </c:catAx>
-      <c:valAx>
-        <c:axId val="614791104"/>
-        <c:scaling>
-          <c:orientation val="minMax"/>
-        </c:scaling>
-        <c:delete val="0"/>
-        <c:axPos val="l"/>
-        <c:majorGridlines>
-          <c:spPr>
-            <a:ln w="9525" cap="flat" cmpd="sng" algn="ctr">
-              <a:solidFill>
-                <a:schemeClr val="tx1">
-                  <a:lumMod val="15000"/>
-                  <a:lumOff val="85000"/>
-                </a:schemeClr>
-              </a:solidFill>
-              <a:round/>
-            </a:ln>
-            <a:effectLst/>
-          </c:spPr>
-        </c:majorGridlines>
-        <c:numFmt formatCode="General" sourceLinked="1"/>
-        <c:majorTickMark val="none"/>
-        <c:minorTickMark val="none"/>
-        <c:tickLblPos val="nextTo"/>
-        <c:spPr>
-          <a:noFill/>
-          <a:ln>
-            <a:noFill/>
-          </a:ln>
-          <a:effectLst/>
-        </c:spPr>
-        <c:txPr>
-          <a:bodyPr rot="-60000000" spcFirstLastPara="1" vertOverflow="ellipsis" vert="horz" wrap="square" anchor="ctr" anchorCtr="1"/>
-          <a:lstStyle/>
-          <a:p>
-            <a:pPr>
-              <a:defRPr sz="1197" b="0" i="0" u="none" strike="noStrike" kern="1200" baseline="0">
-                <a:solidFill>
-                  <a:schemeClr val="tx1">
-                    <a:lumMod val="65000"/>
-                    <a:lumOff val="35000"/>
-                  </a:schemeClr>
-                </a:solidFill>
-                <a:latin typeface="+mn-lt"/>
-                <a:ea typeface="+mn-ea"/>
-                <a:cs typeface="+mn-cs"/>
-              </a:defRPr>
-            </a:pPr>
-            <a:endParaRPr lang="en-US"/>
-          </a:p>
-        </c:txPr>
-        <c:crossAx val="614788192"/>
-        <c:crosses val="autoZero"/>
-        <c:crossBetween val="between"/>
-      </c:valAx>
-      <c:spPr>
-        <a:noFill/>
-        <a:ln>
-          <a:noFill/>
-        </a:ln>
-        <a:effectLst/>
-      </c:spPr>
-    </c:plotArea>
-    <c:legend>
-      <c:legendPos val="b"/>
-      <c:overlay val="0"/>
-      <c:spPr>
-        <a:noFill/>
-        <a:ln>
-          <a:noFill/>
-        </a:ln>
-        <a:effectLst/>
-      </c:spPr>
-      <c:txPr>
-        <a:bodyPr rot="0" spcFirstLastPara="1" vertOverflow="ellipsis" vert="horz" wrap="square" anchor="ctr" anchorCtr="1"/>
-        <a:lstStyle/>
-        <a:p>
-          <a:pPr>
-            <a:defRPr sz="1197" b="0" i="0" u="none" strike="noStrike" kern="1200" baseline="0">
-              <a:solidFill>
-                <a:schemeClr val="tx1">
-                  <a:lumMod val="65000"/>
-                  <a:lumOff val="35000"/>
-                </a:schemeClr>
-              </a:solidFill>
-              <a:latin typeface="+mn-lt"/>
-              <a:ea typeface="+mn-ea"/>
-              <a:cs typeface="+mn-cs"/>
-            </a:defRPr>
-          </a:pPr>
-          <a:endParaRPr lang="en-US"/>
-        </a:p>
-      </c:txPr>
-    </c:legend>
-    <c:plotVisOnly val="1"/>
-    <c:dispBlanksAs val="gap"/>
-    <c:extLst>
-      <c:ext xmlns:c16r3="http://schemas.microsoft.com/office/drawing/2017/03/chart" uri="{56B9EC1D-385E-4148-901F-78D8002777C0}">
-        <c16r3:dataDisplayOptions16>
-          <c16r3:dispNaAsBlank val="1"/>
-        </c16r3:dataDisplayOptions16>
-      </c:ext>
-    </c:extLst>
-    <c:showDLblsOverMax val="0"/>
-  </c:chart>
-  <c:spPr>
-    <a:noFill/>
-    <a:ln>
-      <a:noFill/>
-    </a:ln>
-    <a:effectLst/>
-  </c:spPr>
-  <c:txPr>
-    <a:bodyPr/>
-    <a:lstStyle/>
-    <a:p>
-      <a:pPr>
-        <a:defRPr/>
+        <a:defRPr sz="1600">
+          <a:solidFill>
+            <a:schemeClr val="tx1"/>
+          </a:solidFill>
+        </a:defRPr>
       </a:pPr>
       <a:endParaRPr lang="en-US"/>
     </a:p>
@@ -1020,46 +585,6 @@
 </file>
 
 <file path=ppt/charts/colors1.xml><?xml version="1.0" encoding="utf-8"?>
-<cs:colorStyle xmlns:cs="http://schemas.microsoft.com/office/drawing/2012/chartStyle" xmlns:a="http://schemas.openxmlformats.org/drawingml/2006/main" meth="cycle" id="10">
-  <a:schemeClr val="accent1"/>
-  <a:schemeClr val="accent2"/>
-  <a:schemeClr val="accent3"/>
-  <a:schemeClr val="accent4"/>
-  <a:schemeClr val="accent5"/>
-  <a:schemeClr val="accent6"/>
-  <cs:variation/>
-  <cs:variation>
-    <a:lumMod val="60000"/>
-  </cs:variation>
-  <cs:variation>
-    <a:lumMod val="80000"/>
-    <a:lumOff val="20000"/>
-  </cs:variation>
-  <cs:variation>
-    <a:lumMod val="80000"/>
-  </cs:variation>
-  <cs:variation>
-    <a:lumMod val="60000"/>
-    <a:lumOff val="40000"/>
-  </cs:variation>
-  <cs:variation>
-    <a:lumMod val="50000"/>
-  </cs:variation>
-  <cs:variation>
-    <a:lumMod val="70000"/>
-    <a:lumOff val="30000"/>
-  </cs:variation>
-  <cs:variation>
-    <a:lumMod val="70000"/>
-  </cs:variation>
-  <cs:variation>
-    <a:lumMod val="50000"/>
-    <a:lumOff val="50000"/>
-  </cs:variation>
-</cs:colorStyle>
-</file>
-
-<file path=ppt/charts/colors2.xml><?xml version="1.0" encoding="utf-8"?>
 <cs:colorStyle xmlns:cs="http://schemas.microsoft.com/office/drawing/2012/chartStyle" xmlns:a="http://schemas.openxmlformats.org/drawingml/2006/main" meth="cycle" id="10">
   <a:schemeClr val="accent1"/>
   <a:schemeClr val="accent2"/>
@@ -1111,7 +636,7 @@
         <a:lumOff val="35000"/>
       </a:schemeClr>
     </cs:fontRef>
-    <cs:defRPr sz="1330" kern="1200"/>
+    <cs:defRPr sz="1000" kern="1200"/>
   </cs:axisTitle>
   <cs:categoryAxis>
     <cs:lnRef idx="0"/>
@@ -1134,7 +659,7 @@
         <a:round/>
       </a:ln>
     </cs:spPr>
-    <cs:defRPr sz="1197" kern="1200"/>
+    <cs:defRPr sz="900" kern="1200"/>
   </cs:categoryAxis>
   <cs:chartArea mods="allowNoFillOverride allowNoLineOverride">
     <cs:lnRef idx="0"/>
@@ -1157,7 +682,7 @@
         <a:round/>
       </a:ln>
     </cs:spPr>
-    <cs:defRPr sz="1330" kern="1200"/>
+    <cs:defRPr sz="1000" kern="1200"/>
   </cs:chartArea>
   <cs:dataLabel>
     <cs:lnRef idx="0"/>
@@ -1169,7 +694,7 @@
         <a:lumOff val="25000"/>
       </a:schemeClr>
     </cs:fontRef>
-    <cs:defRPr sz="1197" kern="1200"/>
+    <cs:defRPr sz="900" kern="1200"/>
   </cs:dataLabel>
   <cs:dataLabelCallout>
     <cs:lnRef idx="0"/>
@@ -1194,7 +719,7 @@
         </a:solidFill>
       </a:ln>
     </cs:spPr>
-    <cs:defRPr sz="1197" kern="1200"/>
+    <cs:defRPr sz="900" kern="1200"/>
     <cs:bodyPr rot="0" spcFirstLastPara="1" vertOverflow="clip" horzOverflow="clip" vert="horz" wrap="square" lIns="36576" tIns="18288" rIns="36576" bIns="18288" anchor="ctr" anchorCtr="1">
       <a:spAutoFit/>
     </cs:bodyPr>
@@ -1297,7 +822,7 @@
         <a:round/>
       </a:ln>
     </cs:spPr>
-    <cs:defRPr sz="1197" kern="1200"/>
+    <cs:defRPr sz="900" kern="1200"/>
   </cs:dataTable>
   <cs:downBar>
     <cs:lnRef idx="0"/>
@@ -1461,7 +986,7 @@
         <a:lumOff val="35000"/>
       </a:schemeClr>
     </cs:fontRef>
-    <cs:defRPr sz="1197" kern="1200"/>
+    <cs:defRPr sz="900" kern="1200"/>
   </cs:legend>
   <cs:plotArea mods="allowNoFillOverride allowNoLineOverride">
     <cs:lnRef idx="0"/>
@@ -1489,7 +1014,7 @@
         <a:lumOff val="35000"/>
       </a:schemeClr>
     </cs:fontRef>
-    <cs:defRPr sz="1197" kern="1200"/>
+    <cs:defRPr sz="900" kern="1200"/>
   </cs:seriesAxis>
   <cs:seriesLine>
     <cs:lnRef idx="0"/>
@@ -1520,7 +1045,7 @@
         <a:lumOff val="35000"/>
       </a:schemeClr>
     </cs:fontRef>
-    <cs:defRPr sz="1862" b="0" kern="1200" spc="0" baseline="0"/>
+    <cs:defRPr sz="1400" b="0" kern="1200" spc="0" baseline="0"/>
   </cs:title>
   <cs:trendline>
     <cs:lnRef idx="0">
@@ -1550,7 +1075,7 @@
         <a:lumOff val="35000"/>
       </a:schemeClr>
     </cs:fontRef>
-    <cs:defRPr sz="1197" kern="1200"/>
+    <cs:defRPr sz="900" kern="1200"/>
   </cs:trendlineLabel>
   <cs:upBar>
     <cs:lnRef idx="0"/>
@@ -1583,510 +1108,7 @@
         <a:lumOff val="35000"/>
       </a:schemeClr>
     </cs:fontRef>
-    <cs:defRPr sz="1197" kern="1200"/>
-  </cs:valueAxis>
-  <cs:wall>
-    <cs:lnRef idx="0"/>
-    <cs:fillRef idx="0"/>
-    <cs:effectRef idx="0"/>
-    <cs:fontRef idx="minor">
-      <a:schemeClr val="tx1"/>
-    </cs:fontRef>
-    <cs:spPr>
-      <a:noFill/>
-      <a:ln>
-        <a:noFill/>
-      </a:ln>
-    </cs:spPr>
-  </cs:wall>
-</cs:chartStyle>
-</file>
-
-<file path=ppt/charts/style2.xml><?xml version="1.0" encoding="utf-8"?>
-<cs:chartStyle xmlns:cs="http://schemas.microsoft.com/office/drawing/2012/chartStyle" xmlns:a="http://schemas.openxmlformats.org/drawingml/2006/main" id="201">
-  <cs:axisTitle>
-    <cs:lnRef idx="0"/>
-    <cs:fillRef idx="0"/>
-    <cs:effectRef idx="0"/>
-    <cs:fontRef idx="minor">
-      <a:schemeClr val="tx1">
-        <a:lumMod val="65000"/>
-        <a:lumOff val="35000"/>
-      </a:schemeClr>
-    </cs:fontRef>
-    <cs:defRPr sz="1330" kern="1200"/>
-  </cs:axisTitle>
-  <cs:categoryAxis>
-    <cs:lnRef idx="0"/>
-    <cs:fillRef idx="0"/>
-    <cs:effectRef idx="0"/>
-    <cs:fontRef idx="minor">
-      <a:schemeClr val="tx1">
-        <a:lumMod val="65000"/>
-        <a:lumOff val="35000"/>
-      </a:schemeClr>
-    </cs:fontRef>
-    <cs:spPr>
-      <a:ln w="9525" cap="flat" cmpd="sng" algn="ctr">
-        <a:solidFill>
-          <a:schemeClr val="tx1">
-            <a:lumMod val="15000"/>
-            <a:lumOff val="85000"/>
-          </a:schemeClr>
-        </a:solidFill>
-        <a:round/>
-      </a:ln>
-    </cs:spPr>
-    <cs:defRPr sz="1197" kern="1200"/>
-  </cs:categoryAxis>
-  <cs:chartArea mods="allowNoFillOverride allowNoLineOverride">
-    <cs:lnRef idx="0"/>
-    <cs:fillRef idx="0"/>
-    <cs:effectRef idx="0"/>
-    <cs:fontRef idx="minor">
-      <a:schemeClr val="tx1"/>
-    </cs:fontRef>
-    <cs:spPr>
-      <a:solidFill>
-        <a:schemeClr val="bg1"/>
-      </a:solidFill>
-      <a:ln w="9525" cap="flat" cmpd="sng" algn="ctr">
-        <a:solidFill>
-          <a:schemeClr val="tx1">
-            <a:lumMod val="15000"/>
-            <a:lumOff val="85000"/>
-          </a:schemeClr>
-        </a:solidFill>
-        <a:round/>
-      </a:ln>
-    </cs:spPr>
-    <cs:defRPr sz="1330" kern="1200"/>
-  </cs:chartArea>
-  <cs:dataLabel>
-    <cs:lnRef idx="0"/>
-    <cs:fillRef idx="0"/>
-    <cs:effectRef idx="0"/>
-    <cs:fontRef idx="minor">
-      <a:schemeClr val="tx1">
-        <a:lumMod val="75000"/>
-        <a:lumOff val="25000"/>
-      </a:schemeClr>
-    </cs:fontRef>
-    <cs:defRPr sz="1197" kern="1200"/>
-  </cs:dataLabel>
-  <cs:dataLabelCallout>
-    <cs:lnRef idx="0"/>
-    <cs:fillRef idx="0"/>
-    <cs:effectRef idx="0"/>
-    <cs:fontRef idx="minor">
-      <a:schemeClr val="dk1">
-        <a:lumMod val="65000"/>
-        <a:lumOff val="35000"/>
-      </a:schemeClr>
-    </cs:fontRef>
-    <cs:spPr>
-      <a:solidFill>
-        <a:schemeClr val="lt1"/>
-      </a:solidFill>
-      <a:ln>
-        <a:solidFill>
-          <a:schemeClr val="dk1">
-            <a:lumMod val="25000"/>
-            <a:lumOff val="75000"/>
-          </a:schemeClr>
-        </a:solidFill>
-      </a:ln>
-    </cs:spPr>
-    <cs:defRPr sz="1197" kern="1200"/>
-    <cs:bodyPr rot="0" spcFirstLastPara="1" vertOverflow="clip" horzOverflow="clip" vert="horz" wrap="square" lIns="36576" tIns="18288" rIns="36576" bIns="18288" anchor="ctr" anchorCtr="1">
-      <a:spAutoFit/>
-    </cs:bodyPr>
-  </cs:dataLabelCallout>
-  <cs:dataPoint>
-    <cs:lnRef idx="0"/>
-    <cs:fillRef idx="1">
-      <cs:styleClr val="auto"/>
-    </cs:fillRef>
-    <cs:effectRef idx="0"/>
-    <cs:fontRef idx="minor">
-      <a:schemeClr val="tx1"/>
-    </cs:fontRef>
-  </cs:dataPoint>
-  <cs:dataPoint3D>
-    <cs:lnRef idx="0"/>
-    <cs:fillRef idx="1">
-      <cs:styleClr val="auto"/>
-    </cs:fillRef>
-    <cs:effectRef idx="0"/>
-    <cs:fontRef idx="minor">
-      <a:schemeClr val="tx1"/>
-    </cs:fontRef>
-  </cs:dataPoint3D>
-  <cs:dataPointLine>
-    <cs:lnRef idx="0">
-      <cs:styleClr val="auto"/>
-    </cs:lnRef>
-    <cs:fillRef idx="1"/>
-    <cs:effectRef idx="0"/>
-    <cs:fontRef idx="minor">
-      <a:schemeClr val="tx1"/>
-    </cs:fontRef>
-    <cs:spPr>
-      <a:ln w="28575" cap="rnd">
-        <a:solidFill>
-          <a:schemeClr val="phClr"/>
-        </a:solidFill>
-        <a:round/>
-      </a:ln>
-    </cs:spPr>
-  </cs:dataPointLine>
-  <cs:dataPointMarker>
-    <cs:lnRef idx="0">
-      <cs:styleClr val="auto"/>
-    </cs:lnRef>
-    <cs:fillRef idx="1">
-      <cs:styleClr val="auto"/>
-    </cs:fillRef>
-    <cs:effectRef idx="0"/>
-    <cs:fontRef idx="minor">
-      <a:schemeClr val="tx1"/>
-    </cs:fontRef>
-    <cs:spPr>
-      <a:ln w="9525">
-        <a:solidFill>
-          <a:schemeClr val="phClr"/>
-        </a:solidFill>
-      </a:ln>
-    </cs:spPr>
-  </cs:dataPointMarker>
-  <cs:dataPointMarkerLayout symbol="circle" size="5"/>
-  <cs:dataPointWireframe>
-    <cs:lnRef idx="0">
-      <cs:styleClr val="auto"/>
-    </cs:lnRef>
-    <cs:fillRef idx="1"/>
-    <cs:effectRef idx="0"/>
-    <cs:fontRef idx="minor">
-      <a:schemeClr val="tx1"/>
-    </cs:fontRef>
-    <cs:spPr>
-      <a:ln w="9525" cap="rnd">
-        <a:solidFill>
-          <a:schemeClr val="phClr"/>
-        </a:solidFill>
-        <a:round/>
-      </a:ln>
-    </cs:spPr>
-  </cs:dataPointWireframe>
-  <cs:dataTable>
-    <cs:lnRef idx="0"/>
-    <cs:fillRef idx="0"/>
-    <cs:effectRef idx="0"/>
-    <cs:fontRef idx="minor">
-      <a:schemeClr val="tx1">
-        <a:lumMod val="65000"/>
-        <a:lumOff val="35000"/>
-      </a:schemeClr>
-    </cs:fontRef>
-    <cs:spPr>
-      <a:noFill/>
-      <a:ln w="9525" cap="flat" cmpd="sng" algn="ctr">
-        <a:solidFill>
-          <a:schemeClr val="tx1">
-            <a:lumMod val="15000"/>
-            <a:lumOff val="85000"/>
-          </a:schemeClr>
-        </a:solidFill>
-        <a:round/>
-      </a:ln>
-    </cs:spPr>
-    <cs:defRPr sz="1197" kern="1200"/>
-  </cs:dataTable>
-  <cs:downBar>
-    <cs:lnRef idx="0"/>
-    <cs:fillRef idx="0"/>
-    <cs:effectRef idx="0"/>
-    <cs:fontRef idx="minor">
-      <a:schemeClr val="dk1"/>
-    </cs:fontRef>
-    <cs:spPr>
-      <a:solidFill>
-        <a:schemeClr val="dk1">
-          <a:lumMod val="65000"/>
-          <a:lumOff val="35000"/>
-        </a:schemeClr>
-      </a:solidFill>
-      <a:ln w="9525">
-        <a:solidFill>
-          <a:schemeClr val="tx1">
-            <a:lumMod val="65000"/>
-            <a:lumOff val="35000"/>
-          </a:schemeClr>
-        </a:solidFill>
-      </a:ln>
-    </cs:spPr>
-  </cs:downBar>
-  <cs:dropLine>
-    <cs:lnRef idx="0"/>
-    <cs:fillRef idx="0"/>
-    <cs:effectRef idx="0"/>
-    <cs:fontRef idx="minor">
-      <a:schemeClr val="tx1"/>
-    </cs:fontRef>
-    <cs:spPr>
-      <a:ln w="9525" cap="flat" cmpd="sng" algn="ctr">
-        <a:solidFill>
-          <a:schemeClr val="tx1">
-            <a:lumMod val="35000"/>
-            <a:lumOff val="65000"/>
-          </a:schemeClr>
-        </a:solidFill>
-        <a:round/>
-      </a:ln>
-    </cs:spPr>
-  </cs:dropLine>
-  <cs:errorBar>
-    <cs:lnRef idx="0"/>
-    <cs:fillRef idx="0"/>
-    <cs:effectRef idx="0"/>
-    <cs:fontRef idx="minor">
-      <a:schemeClr val="tx1"/>
-    </cs:fontRef>
-    <cs:spPr>
-      <a:ln w="9525" cap="flat" cmpd="sng" algn="ctr">
-        <a:solidFill>
-          <a:schemeClr val="tx1">
-            <a:lumMod val="65000"/>
-            <a:lumOff val="35000"/>
-          </a:schemeClr>
-        </a:solidFill>
-        <a:round/>
-      </a:ln>
-    </cs:spPr>
-  </cs:errorBar>
-  <cs:floor>
-    <cs:lnRef idx="0"/>
-    <cs:fillRef idx="0"/>
-    <cs:effectRef idx="0"/>
-    <cs:fontRef idx="minor">
-      <a:schemeClr val="tx1"/>
-    </cs:fontRef>
-    <cs:spPr>
-      <a:noFill/>
-      <a:ln>
-        <a:noFill/>
-      </a:ln>
-    </cs:spPr>
-  </cs:floor>
-  <cs:gridlineMajor>
-    <cs:lnRef idx="0"/>
-    <cs:fillRef idx="0"/>
-    <cs:effectRef idx="0"/>
-    <cs:fontRef idx="minor">
-      <a:schemeClr val="tx1"/>
-    </cs:fontRef>
-    <cs:spPr>
-      <a:ln w="9525" cap="flat" cmpd="sng" algn="ctr">
-        <a:solidFill>
-          <a:schemeClr val="tx1">
-            <a:lumMod val="15000"/>
-            <a:lumOff val="85000"/>
-          </a:schemeClr>
-        </a:solidFill>
-        <a:round/>
-      </a:ln>
-    </cs:spPr>
-  </cs:gridlineMajor>
-  <cs:gridlineMinor>
-    <cs:lnRef idx="0"/>
-    <cs:fillRef idx="0"/>
-    <cs:effectRef idx="0"/>
-    <cs:fontRef idx="minor">
-      <a:schemeClr val="tx1"/>
-    </cs:fontRef>
-    <cs:spPr>
-      <a:ln w="9525" cap="flat" cmpd="sng" algn="ctr">
-        <a:solidFill>
-          <a:schemeClr val="tx1">
-            <a:lumMod val="5000"/>
-            <a:lumOff val="95000"/>
-          </a:schemeClr>
-        </a:solidFill>
-        <a:round/>
-      </a:ln>
-    </cs:spPr>
-  </cs:gridlineMinor>
-  <cs:hiLoLine>
-    <cs:lnRef idx="0"/>
-    <cs:fillRef idx="0"/>
-    <cs:effectRef idx="0"/>
-    <cs:fontRef idx="minor">
-      <a:schemeClr val="tx1"/>
-    </cs:fontRef>
-    <cs:spPr>
-      <a:ln w="9525" cap="flat" cmpd="sng" algn="ctr">
-        <a:solidFill>
-          <a:schemeClr val="tx1">
-            <a:lumMod val="75000"/>
-            <a:lumOff val="25000"/>
-          </a:schemeClr>
-        </a:solidFill>
-        <a:round/>
-      </a:ln>
-    </cs:spPr>
-  </cs:hiLoLine>
-  <cs:leaderLine>
-    <cs:lnRef idx="0"/>
-    <cs:fillRef idx="0"/>
-    <cs:effectRef idx="0"/>
-    <cs:fontRef idx="minor">
-      <a:schemeClr val="tx1"/>
-    </cs:fontRef>
-    <cs:spPr>
-      <a:ln w="9525" cap="flat" cmpd="sng" algn="ctr">
-        <a:solidFill>
-          <a:schemeClr val="tx1">
-            <a:lumMod val="35000"/>
-            <a:lumOff val="65000"/>
-          </a:schemeClr>
-        </a:solidFill>
-        <a:round/>
-      </a:ln>
-    </cs:spPr>
-  </cs:leaderLine>
-  <cs:legend>
-    <cs:lnRef idx="0"/>
-    <cs:fillRef idx="0"/>
-    <cs:effectRef idx="0"/>
-    <cs:fontRef idx="minor">
-      <a:schemeClr val="tx1">
-        <a:lumMod val="65000"/>
-        <a:lumOff val="35000"/>
-      </a:schemeClr>
-    </cs:fontRef>
-    <cs:defRPr sz="1197" kern="1200"/>
-  </cs:legend>
-  <cs:plotArea mods="allowNoFillOverride allowNoLineOverride">
-    <cs:lnRef idx="0"/>
-    <cs:fillRef idx="0"/>
-    <cs:effectRef idx="0"/>
-    <cs:fontRef idx="minor">
-      <a:schemeClr val="tx1"/>
-    </cs:fontRef>
-  </cs:plotArea>
-  <cs:plotArea3D mods="allowNoFillOverride allowNoLineOverride">
-    <cs:lnRef idx="0"/>
-    <cs:fillRef idx="0"/>
-    <cs:effectRef idx="0"/>
-    <cs:fontRef idx="minor">
-      <a:schemeClr val="tx1"/>
-    </cs:fontRef>
-  </cs:plotArea3D>
-  <cs:seriesAxis>
-    <cs:lnRef idx="0"/>
-    <cs:fillRef idx="0"/>
-    <cs:effectRef idx="0"/>
-    <cs:fontRef idx="minor">
-      <a:schemeClr val="tx1">
-        <a:lumMod val="65000"/>
-        <a:lumOff val="35000"/>
-      </a:schemeClr>
-    </cs:fontRef>
-    <cs:defRPr sz="1197" kern="1200"/>
-  </cs:seriesAxis>
-  <cs:seriesLine>
-    <cs:lnRef idx="0"/>
-    <cs:fillRef idx="0"/>
-    <cs:effectRef idx="0"/>
-    <cs:fontRef idx="minor">
-      <a:schemeClr val="tx1"/>
-    </cs:fontRef>
-    <cs:spPr>
-      <a:ln w="9525" cap="flat" cmpd="sng" algn="ctr">
-        <a:solidFill>
-          <a:schemeClr val="tx1">
-            <a:lumMod val="35000"/>
-            <a:lumOff val="65000"/>
-          </a:schemeClr>
-        </a:solidFill>
-        <a:round/>
-      </a:ln>
-    </cs:spPr>
-  </cs:seriesLine>
-  <cs:title>
-    <cs:lnRef idx="0"/>
-    <cs:fillRef idx="0"/>
-    <cs:effectRef idx="0"/>
-    <cs:fontRef idx="minor">
-      <a:schemeClr val="tx1">
-        <a:lumMod val="65000"/>
-        <a:lumOff val="35000"/>
-      </a:schemeClr>
-    </cs:fontRef>
-    <cs:defRPr sz="1862" b="0" kern="1200" spc="0" baseline="0"/>
-  </cs:title>
-  <cs:trendline>
-    <cs:lnRef idx="0">
-      <cs:styleClr val="auto"/>
-    </cs:lnRef>
-    <cs:fillRef idx="0"/>
-    <cs:effectRef idx="0"/>
-    <cs:fontRef idx="minor">
-      <a:schemeClr val="tx1"/>
-    </cs:fontRef>
-    <cs:spPr>
-      <a:ln w="19050" cap="rnd">
-        <a:solidFill>
-          <a:schemeClr val="phClr"/>
-        </a:solidFill>
-        <a:prstDash val="sysDot"/>
-      </a:ln>
-    </cs:spPr>
-  </cs:trendline>
-  <cs:trendlineLabel>
-    <cs:lnRef idx="0"/>
-    <cs:fillRef idx="0"/>
-    <cs:effectRef idx="0"/>
-    <cs:fontRef idx="minor">
-      <a:schemeClr val="tx1">
-        <a:lumMod val="65000"/>
-        <a:lumOff val="35000"/>
-      </a:schemeClr>
-    </cs:fontRef>
-    <cs:defRPr sz="1197" kern="1200"/>
-  </cs:trendlineLabel>
-  <cs:upBar>
-    <cs:lnRef idx="0"/>
-    <cs:fillRef idx="0"/>
-    <cs:effectRef idx="0"/>
-    <cs:fontRef idx="minor">
-      <a:schemeClr val="dk1"/>
-    </cs:fontRef>
-    <cs:spPr>
-      <a:solidFill>
-        <a:schemeClr val="lt1"/>
-      </a:solidFill>
-      <a:ln w="9525">
-        <a:solidFill>
-          <a:schemeClr val="tx1">
-            <a:lumMod val="15000"/>
-            <a:lumOff val="85000"/>
-          </a:schemeClr>
-        </a:solidFill>
-      </a:ln>
-    </cs:spPr>
-  </cs:upBar>
-  <cs:valueAxis>
-    <cs:lnRef idx="0"/>
-    <cs:fillRef idx="0"/>
-    <cs:effectRef idx="0"/>
-    <cs:fontRef idx="minor">
-      <a:schemeClr val="tx1">
-        <a:lumMod val="65000"/>
-        <a:lumOff val="35000"/>
-      </a:schemeClr>
-    </cs:fontRef>
-    <cs:defRPr sz="1197" kern="1200"/>
+    <cs:defRPr sz="900" kern="1200"/>
   </cs:valueAxis>
   <cs:wall>
     <cs:lnRef idx="0"/>
@@ -5276,7 +4298,7 @@
           <a:p>
             <a:fld id="{DF7D3DBD-0B5D-4B79-92F9-F17AA9E647F4}" type="datetimeFigureOut">
               <a:rPr lang="en-US" smtClean="0"/>
-              <a:t>10/17/2021</a:t>
+              <a:t>10/18/2021</a:t>
             </a:fld>
             <a:endParaRPr lang="en-US"/>
           </a:p>
@@ -5446,7 +4468,7 @@
           <a:p>
             <a:fld id="{DF7D3DBD-0B5D-4B79-92F9-F17AA9E647F4}" type="datetimeFigureOut">
               <a:rPr lang="en-US" smtClean="0"/>
-              <a:t>10/17/2021</a:t>
+              <a:t>10/18/2021</a:t>
             </a:fld>
             <a:endParaRPr lang="en-US"/>
           </a:p>
@@ -5626,7 +4648,7 @@
           <a:p>
             <a:fld id="{DF7D3DBD-0B5D-4B79-92F9-F17AA9E647F4}" type="datetimeFigureOut">
               <a:rPr lang="en-US" smtClean="0"/>
-              <a:t>10/17/2021</a:t>
+              <a:t>10/18/2021</a:t>
             </a:fld>
             <a:endParaRPr lang="en-US"/>
           </a:p>
@@ -5796,7 +4818,7 @@
           <a:p>
             <a:fld id="{DF7D3DBD-0B5D-4B79-92F9-F17AA9E647F4}" type="datetimeFigureOut">
               <a:rPr lang="en-US" smtClean="0"/>
-              <a:t>10/17/2021</a:t>
+              <a:t>10/18/2021</a:t>
             </a:fld>
             <a:endParaRPr lang="en-US"/>
           </a:p>
@@ -6042,7 +5064,7 @@
           <a:p>
             <a:fld id="{DF7D3DBD-0B5D-4B79-92F9-F17AA9E647F4}" type="datetimeFigureOut">
               <a:rPr lang="en-US" smtClean="0"/>
-              <a:t>10/17/2021</a:t>
+              <a:t>10/18/2021</a:t>
             </a:fld>
             <a:endParaRPr lang="en-US"/>
           </a:p>
@@ -6274,7 +5296,7 @@
           <a:p>
             <a:fld id="{DF7D3DBD-0B5D-4B79-92F9-F17AA9E647F4}" type="datetimeFigureOut">
               <a:rPr lang="en-US" smtClean="0"/>
-              <a:t>10/17/2021</a:t>
+              <a:t>10/18/2021</a:t>
             </a:fld>
             <a:endParaRPr lang="en-US"/>
           </a:p>
@@ -6641,7 +5663,7 @@
           <a:p>
             <a:fld id="{DF7D3DBD-0B5D-4B79-92F9-F17AA9E647F4}" type="datetimeFigureOut">
               <a:rPr lang="en-US" smtClean="0"/>
-              <a:t>10/17/2021</a:t>
+              <a:t>10/18/2021</a:t>
             </a:fld>
             <a:endParaRPr lang="en-US"/>
           </a:p>
@@ -6759,7 +5781,7 @@
           <a:p>
             <a:fld id="{DF7D3DBD-0B5D-4B79-92F9-F17AA9E647F4}" type="datetimeFigureOut">
               <a:rPr lang="en-US" smtClean="0"/>
-              <a:t>10/17/2021</a:t>
+              <a:t>10/18/2021</a:t>
             </a:fld>
             <a:endParaRPr lang="en-US"/>
           </a:p>
@@ -6854,7 +5876,7 @@
           <a:p>
             <a:fld id="{DF7D3DBD-0B5D-4B79-92F9-F17AA9E647F4}" type="datetimeFigureOut">
               <a:rPr lang="en-US" smtClean="0"/>
-              <a:t>10/17/2021</a:t>
+              <a:t>10/18/2021</a:t>
             </a:fld>
             <a:endParaRPr lang="en-US"/>
           </a:p>
@@ -7131,7 +6153,7 @@
           <a:p>
             <a:fld id="{DF7D3DBD-0B5D-4B79-92F9-F17AA9E647F4}" type="datetimeFigureOut">
               <a:rPr lang="en-US" smtClean="0"/>
-              <a:t>10/17/2021</a:t>
+              <a:t>10/18/2021</a:t>
             </a:fld>
             <a:endParaRPr lang="en-US"/>
           </a:p>
@@ -7388,7 +6410,7 @@
           <a:p>
             <a:fld id="{DF7D3DBD-0B5D-4B79-92F9-F17AA9E647F4}" type="datetimeFigureOut">
               <a:rPr lang="en-US" smtClean="0"/>
-              <a:t>10/17/2021</a:t>
+              <a:t>10/18/2021</a:t>
             </a:fld>
             <a:endParaRPr lang="en-US"/>
           </a:p>
@@ -7601,7 +6623,7 @@
           <a:p>
             <a:fld id="{DF7D3DBD-0B5D-4B79-92F9-F17AA9E647F4}" type="datetimeFigureOut">
               <a:rPr lang="en-US" smtClean="0"/>
-              <a:t>10/17/2021</a:t>
+              <a:t>10/18/2021</a:t>
             </a:fld>
             <a:endParaRPr lang="en-US"/>
           </a:p>
@@ -8805,149 +7827,35 @@
           </a:p>
         </p:txBody>
       </p:sp>
-      <p:grpSp>
-        <p:nvGrpSpPr>
-          <p:cNvPr id="8" name="Group 7">
+      <p:pic>
+        <p:nvPicPr>
+          <p:cNvPr id="13" name="Picture 12">
             <a:extLst>
               <a:ext uri="{FF2B5EF4-FFF2-40B4-BE49-F238E27FC236}">
-                <a16:creationId xmlns:a16="http://schemas.microsoft.com/office/drawing/2014/main" id="{E71E5EF2-5CB7-4728-B38F-4559A98064D2}"/>
+                <a16:creationId xmlns:a16="http://schemas.microsoft.com/office/drawing/2014/main" id="{4E98657A-578F-4D69-ACFF-A90AF0B62A89}"/>
               </a:ext>
             </a:extLst>
           </p:cNvPr>
-          <p:cNvGrpSpPr/>
+          <p:cNvPicPr>
+            <a:picLocks noChangeAspect="1"/>
+          </p:cNvPicPr>
           <p:nvPr/>
-        </p:nvGrpSpPr>
-        <p:grpSpPr>
+        </p:nvPicPr>
+        <p:blipFill rotWithShape="1">
+          <a:blip r:embed="rId2"/>
+          <a:srcRect r="11726"/>
+          <a:stretch/>
+        </p:blipFill>
+        <p:spPr>
           <a:xfrm>
-            <a:off x="1557518" y="2472621"/>
-            <a:ext cx="1912758" cy="1912758"/>
-            <a:chOff x="5665375" y="1478316"/>
-            <a:chExt cx="2462033" cy="2462033"/>
+            <a:off x="5346710" y="0"/>
+            <a:ext cx="6845290" cy="6858000"/>
           </a:xfrm>
-        </p:grpSpPr>
-        <p:sp>
-          <p:nvSpPr>
-            <p:cNvPr id="9" name="Oval 8">
-              <a:extLst>
-                <a:ext uri="{FF2B5EF4-FFF2-40B4-BE49-F238E27FC236}">
-                  <a16:creationId xmlns:a16="http://schemas.microsoft.com/office/drawing/2014/main" id="{12FA4AC0-A606-4700-8912-F95CE18507E1}"/>
-                </a:ext>
-              </a:extLst>
-            </p:cNvPr>
-            <p:cNvSpPr/>
-            <p:nvPr/>
-          </p:nvSpPr>
-          <p:spPr>
-            <a:xfrm>
-              <a:off x="5665375" y="1478316"/>
-              <a:ext cx="2462033" cy="2462033"/>
-            </a:xfrm>
-            <a:prstGeom prst="ellipse">
-              <a:avLst/>
-            </a:prstGeom>
-          </p:spPr>
-          <p:style>
-            <a:lnRef idx="2">
-              <a:schemeClr val="dk1">
-                <a:shade val="80000"/>
-                <a:hueOff val="0"/>
-                <a:satOff val="0"/>
-                <a:lumOff val="0"/>
-                <a:alphaOff val="0"/>
-              </a:schemeClr>
-            </a:lnRef>
-            <a:fillRef idx="1">
-              <a:schemeClr val="lt1">
-                <a:hueOff val="0"/>
-                <a:satOff val="0"/>
-                <a:lumOff val="0"/>
-                <a:alphaOff val="0"/>
-              </a:schemeClr>
-            </a:fillRef>
-            <a:effectRef idx="0">
-              <a:schemeClr val="lt1">
-                <a:hueOff val="0"/>
-                <a:satOff val="0"/>
-                <a:lumOff val="0"/>
-                <a:alphaOff val="0"/>
-              </a:schemeClr>
-            </a:effectRef>
-            <a:fontRef idx="minor">
-              <a:schemeClr val="dk1">
-                <a:hueOff val="0"/>
-                <a:satOff val="0"/>
-                <a:lumOff val="0"/>
-                <a:alphaOff val="0"/>
-              </a:schemeClr>
-            </a:fontRef>
-          </p:style>
-        </p:sp>
-        <p:sp>
-          <p:nvSpPr>
-            <p:cNvPr id="10" name="Oval 4">
-              <a:extLst>
-                <a:ext uri="{FF2B5EF4-FFF2-40B4-BE49-F238E27FC236}">
-                  <a16:creationId xmlns:a16="http://schemas.microsoft.com/office/drawing/2014/main" id="{B1BBFA59-13E1-453B-B98A-95269EED1CA5}"/>
-                </a:ext>
-              </a:extLst>
-            </p:cNvPr>
-            <p:cNvSpPr txBox="1"/>
-            <p:nvPr/>
-          </p:nvSpPr>
-          <p:spPr>
-            <a:xfrm>
-              <a:off x="6025931" y="1838872"/>
-              <a:ext cx="1740921" cy="1740921"/>
-            </a:xfrm>
-            <a:prstGeom prst="rect">
-              <a:avLst/>
-            </a:prstGeom>
-          </p:spPr>
-          <p:style>
-            <a:lnRef idx="0">
-              <a:scrgbClr r="0" g="0" b="0"/>
-            </a:lnRef>
-            <a:fillRef idx="0">
-              <a:scrgbClr r="0" g="0" b="0"/>
-            </a:fillRef>
-            <a:effectRef idx="0">
-              <a:scrgbClr r="0" g="0" b="0"/>
-            </a:effectRef>
-            <a:fontRef idx="minor">
-              <a:schemeClr val="dk1">
-                <a:hueOff val="0"/>
-                <a:satOff val="0"/>
-                <a:lumOff val="0"/>
-                <a:alphaOff val="0"/>
-              </a:schemeClr>
-            </a:fontRef>
-          </p:style>
-          <p:txBody>
-            <a:bodyPr spcFirstLastPara="0" vert="horz" wrap="square" lIns="20320" tIns="20320" rIns="20320" bIns="20320" numCol="1" spcCol="1270" anchor="ctr" anchorCtr="0">
-              <a:noAutofit/>
-            </a:bodyPr>
-            <a:lstStyle/>
-            <a:p>
-              <a:pPr marL="0" lvl="0" indent="0" algn="ctr" defTabSz="711200">
-                <a:lnSpc>
-                  <a:spcPct val="90000"/>
-                </a:lnSpc>
-                <a:spcBef>
-                  <a:spcPct val="0"/>
-                </a:spcBef>
-                <a:spcAft>
-                  <a:spcPct val="35000"/>
-                </a:spcAft>
-                <a:buNone/>
-              </a:pPr>
-              <a:r>
-                <a:rPr lang="en-US" sz="1600" kern="1200" dirty="0"/>
-                <a:t>📈 Linear regression model</a:t>
-              </a:r>
-            </a:p>
-          </p:txBody>
-        </p:sp>
-      </p:grpSp>
+          <a:prstGeom prst="rect">
+            <a:avLst/>
+          </a:prstGeom>
+        </p:spPr>
+      </p:pic>
     </p:spTree>
     <p:extLst>
       <p:ext uri="{BB962C8B-B14F-4D97-AF65-F5344CB8AC3E}">
@@ -8962,6 +7870,143 @@
 </file>
 
 <file path=ppt/slides/slide13.xml><?xml version="1.0" encoding="utf-8"?>
+<p:sld xmlns:a="http://schemas.openxmlformats.org/drawingml/2006/main" xmlns:r="http://schemas.openxmlformats.org/officeDocument/2006/relationships" xmlns:p="http://schemas.openxmlformats.org/presentationml/2006/main">
+  <p:cSld>
+    <p:spTree>
+      <p:nvGrpSpPr>
+        <p:cNvPr id="1" name=""/>
+        <p:cNvGrpSpPr/>
+        <p:nvPr/>
+      </p:nvGrpSpPr>
+      <p:grpSpPr>
+        <a:xfrm>
+          <a:off x="0" y="0"/>
+          <a:ext cx="0" cy="0"/>
+          <a:chOff x="0" y="0"/>
+          <a:chExt cx="0" cy="0"/>
+        </a:xfrm>
+      </p:grpSpPr>
+      <p:sp>
+        <p:nvSpPr>
+          <p:cNvPr id="2" name="Title 1">
+            <a:extLst>
+              <a:ext uri="{FF2B5EF4-FFF2-40B4-BE49-F238E27FC236}">
+                <a16:creationId xmlns:a16="http://schemas.microsoft.com/office/drawing/2014/main" id="{765EBF66-776B-44CD-B84A-5B13AE020C97}"/>
+              </a:ext>
+            </a:extLst>
+          </p:cNvPr>
+          <p:cNvSpPr>
+            <a:spLocks noGrp="1"/>
+          </p:cNvSpPr>
+          <p:nvPr>
+            <p:ph type="title"/>
+          </p:nvPr>
+        </p:nvSpPr>
+        <p:spPr/>
+        <p:txBody>
+          <a:bodyPr/>
+          <a:lstStyle/>
+          <a:p>
+            <a:r>
+              <a:rPr lang="en-US" dirty="0"/>
+              <a:t>Try to test in 5 methods</a:t>
+            </a:r>
+          </a:p>
+        </p:txBody>
+      </p:sp>
+      <p:sp>
+        <p:nvSpPr>
+          <p:cNvPr id="5" name="Content Placeholder 2">
+            <a:extLst>
+              <a:ext uri="{FF2B5EF4-FFF2-40B4-BE49-F238E27FC236}">
+                <a16:creationId xmlns:a16="http://schemas.microsoft.com/office/drawing/2014/main" id="{831105EF-6455-4120-99AF-839E8D9C596F}"/>
+              </a:ext>
+            </a:extLst>
+          </p:cNvPr>
+          <p:cNvSpPr>
+            <a:spLocks noGrp="1"/>
+          </p:cNvSpPr>
+          <p:nvPr>
+            <p:ph idx="1"/>
+          </p:nvPr>
+        </p:nvSpPr>
+        <p:spPr>
+          <a:xfrm>
+            <a:off x="838200" y="1825625"/>
+            <a:ext cx="10515600" cy="4351338"/>
+          </a:xfrm>
+        </p:spPr>
+        <p:txBody>
+          <a:bodyPr>
+            <a:normAutofit/>
+          </a:bodyPr>
+          <a:lstStyle/>
+          <a:p>
+            <a:pPr marL="514350" indent="-514350">
+              <a:buFont typeface="+mj-lt"/>
+              <a:buAutoNum type="arabicPeriod"/>
+            </a:pPr>
+            <a:r>
+              <a:rPr lang="en-US" dirty="0"/>
+              <a:t>Multiple Linear Regression (Original)</a:t>
+            </a:r>
+          </a:p>
+          <a:p>
+            <a:pPr marL="514350" indent="-514350">
+              <a:buFont typeface="+mj-lt"/>
+              <a:buAutoNum type="arabicPeriod"/>
+            </a:pPr>
+            <a:r>
+              <a:rPr lang="en-US" dirty="0"/>
+              <a:t>K-folds Cross Validation (+ Repeats)</a:t>
+            </a:r>
+          </a:p>
+          <a:p>
+            <a:pPr marL="514350" indent="-514350">
+              <a:buFont typeface="+mj-lt"/>
+              <a:buAutoNum type="arabicPeriod"/>
+            </a:pPr>
+            <a:r>
+              <a:rPr lang="en-US" dirty="0"/>
+              <a:t>Features Selection: Recursive Feature Elimination (RFE)</a:t>
+            </a:r>
+          </a:p>
+          <a:p>
+            <a:pPr marL="514350" indent="-514350">
+              <a:buFont typeface="+mj-lt"/>
+              <a:buAutoNum type="arabicPeriod"/>
+            </a:pPr>
+            <a:r>
+              <a:rPr lang="en-US" dirty="0"/>
+              <a:t>Grid Search CV</a:t>
+            </a:r>
+          </a:p>
+          <a:p>
+            <a:pPr marL="514350" indent="-514350">
+              <a:buFont typeface="+mj-lt"/>
+              <a:buAutoNum type="arabicPeriod"/>
+            </a:pPr>
+            <a:r>
+              <a:rPr lang="en-US" dirty="0"/>
+              <a:t>Polynomial Regression ⭐</a:t>
+            </a:r>
+          </a:p>
+        </p:txBody>
+      </p:sp>
+    </p:spTree>
+    <p:extLst>
+      <p:ext uri="{BB962C8B-B14F-4D97-AF65-F5344CB8AC3E}">
+        <p14:creationId xmlns:p14="http://schemas.microsoft.com/office/powerpoint/2010/main" val="2156695451"/>
+      </p:ext>
+    </p:extLst>
+  </p:cSld>
+  <p:clrMapOvr>
+    <a:masterClrMapping/>
+  </p:clrMapOvr>
+</p:sld>
+</file>
+
+<file path=ppt/slides/slide14.xml><?xml version="1.0" encoding="utf-8"?>
 <p:sld xmlns:a="http://schemas.openxmlformats.org/drawingml/2006/main" xmlns:r="http://schemas.openxmlformats.org/officeDocument/2006/relationships" xmlns:p="http://schemas.openxmlformats.org/presentationml/2006/main">
   <p:cSld>
     <p:spTree>
@@ -9001,7 +8046,147 @@
           <a:p>
             <a:r>
               <a:rPr lang="en-US" dirty="0"/>
-              <a:t>Test results</a:t>
+              <a:t>Polynomial regression</a:t>
+            </a:r>
+          </a:p>
+        </p:txBody>
+      </p:sp>
+      <p:pic>
+        <p:nvPicPr>
+          <p:cNvPr id="1026" name="Picture 2">
+            <a:extLst>
+              <a:ext uri="{FF2B5EF4-FFF2-40B4-BE49-F238E27FC236}">
+                <a16:creationId xmlns:a16="http://schemas.microsoft.com/office/drawing/2014/main" id="{3183A202-FF3D-471D-B7C6-21E5BB26E310}"/>
+              </a:ext>
+            </a:extLst>
+          </p:cNvPr>
+          <p:cNvPicPr>
+            <a:picLocks noChangeAspect="1" noChangeArrowheads="1"/>
+          </p:cNvPicPr>
+          <p:nvPr/>
+        </p:nvPicPr>
+        <p:blipFill>
+          <a:blip r:embed="rId2">
+            <a:extLst>
+              <a:ext uri="{28A0092B-C50C-407E-A947-70E740481C1C}">
+                <a14:useLocalDpi xmlns:a14="http://schemas.microsoft.com/office/drawing/2010/main" val="0"/>
+              </a:ext>
+            </a:extLst>
+          </a:blip>
+          <a:srcRect/>
+          <a:stretch>
+            <a:fillRect/>
+          </a:stretch>
+        </p:blipFill>
+        <p:spPr bwMode="auto">
+          <a:xfrm>
+            <a:off x="3106738" y="2145358"/>
+            <a:ext cx="5978525" cy="3957935"/>
+          </a:xfrm>
+          <a:prstGeom prst="rect">
+            <a:avLst/>
+          </a:prstGeom>
+          <a:noFill/>
+          <a:extLst>
+            <a:ext uri="{909E8E84-426E-40DD-AFC4-6F175D3DCCD1}">
+              <a14:hiddenFill xmlns:a14="http://schemas.microsoft.com/office/drawing/2010/main">
+                <a:solidFill>
+                  <a:srgbClr val="FFFFFF"/>
+                </a:solidFill>
+              </a14:hiddenFill>
+            </a:ext>
+          </a:extLst>
+        </p:spPr>
+      </p:pic>
+      <p:sp>
+        <p:nvSpPr>
+          <p:cNvPr id="6" name="TextBox 5">
+            <a:extLst>
+              <a:ext uri="{FF2B5EF4-FFF2-40B4-BE49-F238E27FC236}">
+                <a16:creationId xmlns:a16="http://schemas.microsoft.com/office/drawing/2014/main" id="{A875ED3D-5738-43B3-A5F1-14BCAF507DED}"/>
+              </a:ext>
+            </a:extLst>
+          </p:cNvPr>
+          <p:cNvSpPr txBox="1"/>
+          <p:nvPr/>
+        </p:nvSpPr>
+        <p:spPr>
+          <a:xfrm>
+            <a:off x="5456242" y="1776026"/>
+            <a:ext cx="1279517" cy="369332"/>
+          </a:xfrm>
+          <a:prstGeom prst="rect">
+            <a:avLst/>
+          </a:prstGeom>
+          <a:noFill/>
+        </p:spPr>
+        <p:txBody>
+          <a:bodyPr wrap="none" rtlCol="0">
+            <a:spAutoFit/>
+          </a:bodyPr>
+          <a:lstStyle/>
+          <a:p>
+            <a:r>
+              <a:rPr lang="en-US" dirty="0"/>
+              <a:t>Degree = 2</a:t>
+            </a:r>
+          </a:p>
+        </p:txBody>
+      </p:sp>
+    </p:spTree>
+    <p:extLst>
+      <p:ext uri="{BB962C8B-B14F-4D97-AF65-F5344CB8AC3E}">
+        <p14:creationId xmlns:p14="http://schemas.microsoft.com/office/powerpoint/2010/main" val="2526082184"/>
+      </p:ext>
+    </p:extLst>
+  </p:cSld>
+  <p:clrMapOvr>
+    <a:masterClrMapping/>
+  </p:clrMapOvr>
+</p:sld>
+</file>
+
+<file path=ppt/slides/slide15.xml><?xml version="1.0" encoding="utf-8"?>
+<p:sld xmlns:a="http://schemas.openxmlformats.org/drawingml/2006/main" xmlns:r="http://schemas.openxmlformats.org/officeDocument/2006/relationships" xmlns:p="http://schemas.openxmlformats.org/presentationml/2006/main">
+  <p:cSld>
+    <p:spTree>
+      <p:nvGrpSpPr>
+        <p:cNvPr id="1" name=""/>
+        <p:cNvGrpSpPr/>
+        <p:nvPr/>
+      </p:nvGrpSpPr>
+      <p:grpSpPr>
+        <a:xfrm>
+          <a:off x="0" y="0"/>
+          <a:ext cx="0" cy="0"/>
+          <a:chOff x="0" y="0"/>
+          <a:chExt cx="0" cy="0"/>
+        </a:xfrm>
+      </p:grpSpPr>
+      <p:sp>
+        <p:nvSpPr>
+          <p:cNvPr id="2" name="Title 1">
+            <a:extLst>
+              <a:ext uri="{FF2B5EF4-FFF2-40B4-BE49-F238E27FC236}">
+                <a16:creationId xmlns:a16="http://schemas.microsoft.com/office/drawing/2014/main" id="{1F9FC55C-DFFA-419E-BB9C-906FAE015F85}"/>
+              </a:ext>
+            </a:extLst>
+          </p:cNvPr>
+          <p:cNvSpPr>
+            <a:spLocks noGrp="1"/>
+          </p:cNvSpPr>
+          <p:nvPr>
+            <p:ph type="title"/>
+          </p:nvPr>
+        </p:nvSpPr>
+        <p:spPr/>
+        <p:txBody>
+          <a:bodyPr/>
+          <a:lstStyle/>
+          <a:p>
+            <a:r>
+              <a:rPr lang="en-US" dirty="0"/>
+              <a:t>Polynomial regression</a:t>
             </a:r>
           </a:p>
         </p:txBody>
@@ -9074,7 +8259,7 @@
     </p:spTree>
     <p:extLst>
       <p:ext uri="{BB962C8B-B14F-4D97-AF65-F5344CB8AC3E}">
-        <p14:creationId xmlns:p14="http://schemas.microsoft.com/office/powerpoint/2010/main" val="2526082184"/>
+        <p14:creationId xmlns:p14="http://schemas.microsoft.com/office/powerpoint/2010/main" val="1525410695"/>
       </p:ext>
     </p:extLst>
   </p:cSld>
@@ -9084,7 +8269,7 @@
 </p:sld>
 </file>
 
-<file path=ppt/slides/slide14.xml><?xml version="1.0" encoding="utf-8"?>
+<file path=ppt/slides/slide16.xml><?xml version="1.0" encoding="utf-8"?>
 <p:sld xmlns:a="http://schemas.openxmlformats.org/drawingml/2006/main" xmlns:r="http://schemas.openxmlformats.org/officeDocument/2006/relationships" xmlns:p="http://schemas.openxmlformats.org/presentationml/2006/main">
   <p:cSld>
     <p:spTree>
@@ -9124,7 +8309,7 @@
           <a:p>
             <a:r>
               <a:rPr lang="en-US" dirty="0"/>
-              <a:t>Test results</a:t>
+              <a:t>Polynomial regression</a:t>
             </a:r>
           </a:p>
         </p:txBody>
@@ -9228,9 +8413,17 @@
 </p:sld>
 </file>
 
-<file path=ppt/slides/slide15.xml><?xml version="1.0" encoding="utf-8"?>
+<file path=ppt/slides/slide17.xml><?xml version="1.0" encoding="utf-8"?>
 <p:sld xmlns:a="http://schemas.openxmlformats.org/drawingml/2006/main" xmlns:r="http://schemas.openxmlformats.org/officeDocument/2006/relationships" xmlns:p="http://schemas.openxmlformats.org/presentationml/2006/main">
   <p:cSld>
+    <p:bg>
+      <p:bgPr>
+        <a:solidFill>
+          <a:schemeClr val="bg1"/>
+        </a:solidFill>
+        <a:effectLst/>
+      </p:bgPr>
+    </p:bg>
     <p:spTree>
       <p:nvGrpSpPr>
         <p:cNvPr id="1" name=""/>
@@ -9261,47 +8454,837 @@
             <p:ph type="title"/>
           </p:nvPr>
         </p:nvSpPr>
-        <p:spPr/>
+        <p:spPr>
+          <a:xfrm>
+            <a:off x="838199" y="291090"/>
+            <a:ext cx="10515599" cy="932688"/>
+          </a:xfrm>
+        </p:spPr>
         <p:txBody>
-          <a:bodyPr/>
+          <a:bodyPr vert="horz" lIns="91440" tIns="45720" rIns="91440" bIns="45720" rtlCol="0" anchor="b">
+            <a:normAutofit/>
+          </a:bodyPr>
           <a:lstStyle/>
           <a:p>
             <a:r>
-              <a:rPr lang="en-US" dirty="0"/>
-              <a:t>Test results</a:t>
+              <a:rPr lang="en-US" kern="1200" dirty="0">
+                <a:solidFill>
+                  <a:schemeClr val="tx1"/>
+                </a:solidFill>
+                <a:latin typeface="+mj-lt"/>
+                <a:ea typeface="+mj-ea"/>
+                <a:cs typeface="+mj-cs"/>
+              </a:rPr>
+              <a:t>Sample results</a:t>
             </a:r>
           </a:p>
         </p:txBody>
       </p:sp>
-      <p:sp>
-        <p:nvSpPr>
-          <p:cNvPr id="10" name="Content Placeholder 9">
+      <p:graphicFrame>
+        <p:nvGraphicFramePr>
+          <p:cNvPr id="3" name="Table 2">
             <a:extLst>
               <a:ext uri="{FF2B5EF4-FFF2-40B4-BE49-F238E27FC236}">
-                <a16:creationId xmlns:a16="http://schemas.microsoft.com/office/drawing/2014/main" id="{15609B95-D55E-41CF-980F-A1469278172F}"/>
+                <a16:creationId xmlns:a16="http://schemas.microsoft.com/office/drawing/2014/main" id="{6B8F52BD-FEDE-4FE6-B1EE-C7E00EE2A242}"/>
               </a:ext>
             </a:extLst>
           </p:cNvPr>
-          <p:cNvSpPr>
-            <a:spLocks noGrp="1"/>
-          </p:cNvSpPr>
+          <p:cNvGraphicFramePr>
+            <a:graphicFrameLocks noGrp="1"/>
+          </p:cNvGraphicFramePr>
           <p:nvPr>
-            <p:ph idx="1"/>
+            <p:extLst>
+              <p:ext uri="{D42A27DB-BD31-4B8C-83A1-F6EECF244321}">
+                <p14:modId xmlns:p14="http://schemas.microsoft.com/office/powerpoint/2010/main" val="1283023391"/>
+              </p:ext>
+            </p:extLst>
           </p:nvPr>
-        </p:nvSpPr>
-        <p:spPr/>
-        <p:txBody>
-          <a:bodyPr/>
-          <a:lstStyle/>
-          <a:p>
-            <a:r>
-              <a:rPr lang="th-TH" dirty="0"/>
-              <a:t>แสดง ตารางจังหวัดกับผลลัพธ์ที่พยากรออกมาได้</a:t>
-            </a:r>
-            <a:endParaRPr lang="en-US" dirty="0"/>
-          </a:p>
-        </p:txBody>
-      </p:sp>
+        </p:nvGraphicFramePr>
+        <p:xfrm>
+          <a:off x="838200" y="2065179"/>
+          <a:ext cx="10515600" cy="4037996"/>
+        </p:xfrm>
+        <a:graphic>
+          <a:graphicData uri="http://schemas.openxmlformats.org/drawingml/2006/table">
+            <a:tbl>
+              <a:tblPr firstRow="1" bandRow="1">
+                <a:tableStyleId>{9D7B26C5-4107-4FEC-AEDC-1716B250A1EF}</a:tableStyleId>
+              </a:tblPr>
+              <a:tblGrid>
+                <a:gridCol w="2876550">
+                  <a:extLst>
+                    <a:ext uri="{9D8B030D-6E8A-4147-A177-3AD203B41FA5}">
+                      <a16:colId xmlns:a16="http://schemas.microsoft.com/office/drawing/2014/main" val="3835800918"/>
+                    </a:ext>
+                  </a:extLst>
+                </a:gridCol>
+                <a:gridCol w="1329690">
+                  <a:extLst>
+                    <a:ext uri="{9D8B030D-6E8A-4147-A177-3AD203B41FA5}">
+                      <a16:colId xmlns:a16="http://schemas.microsoft.com/office/drawing/2014/main" val="1741944965"/>
+                    </a:ext>
+                  </a:extLst>
+                </a:gridCol>
+                <a:gridCol w="2103120">
+                  <a:extLst>
+                    <a:ext uri="{9D8B030D-6E8A-4147-A177-3AD203B41FA5}">
+                      <a16:colId xmlns:a16="http://schemas.microsoft.com/office/drawing/2014/main" val="471134121"/>
+                    </a:ext>
+                  </a:extLst>
+                </a:gridCol>
+                <a:gridCol w="2103120">
+                  <a:extLst>
+                    <a:ext uri="{9D8B030D-6E8A-4147-A177-3AD203B41FA5}">
+                      <a16:colId xmlns:a16="http://schemas.microsoft.com/office/drawing/2014/main" val="3599363067"/>
+                    </a:ext>
+                  </a:extLst>
+                </a:gridCol>
+                <a:gridCol w="2103120">
+                  <a:extLst>
+                    <a:ext uri="{9D8B030D-6E8A-4147-A177-3AD203B41FA5}">
+                      <a16:colId xmlns:a16="http://schemas.microsoft.com/office/drawing/2014/main" val="2439277073"/>
+                    </a:ext>
+                  </a:extLst>
+                </a:gridCol>
+              </a:tblGrid>
+              <a:tr h="811988">
+                <a:tc>
+                  <a:txBody>
+                    <a:bodyPr/>
+                    <a:lstStyle/>
+                    <a:p>
+                      <a:pPr algn="ctr" fontAlgn="ctr"/>
+                      <a:r>
+                        <a:rPr lang="en-US" sz="1800" dirty="0">
+                          <a:effectLst/>
+                          <a:latin typeface="+mj-lt"/>
+                        </a:rPr>
+                        <a:t>Province</a:t>
+                      </a:r>
+                    </a:p>
+                  </a:txBody>
+                  <a:tcPr marL="109728" marR="109728" marT="54864" marB="54864" anchor="ctr"/>
+                </a:tc>
+                <a:tc>
+                  <a:txBody>
+                    <a:bodyPr/>
+                    <a:lstStyle/>
+                    <a:p>
+                      <a:pPr algn="ctr" fontAlgn="ctr"/>
+                      <a:r>
+                        <a:rPr lang="en-US" sz="1800" dirty="0">
+                          <a:effectLst/>
+                          <a:latin typeface="+mj-lt"/>
+                        </a:rPr>
+                        <a:t>Year</a:t>
+                      </a:r>
+                    </a:p>
+                  </a:txBody>
+                  <a:tcPr marL="109728" marR="109728" marT="54864" marB="54864" anchor="ctr"/>
+                </a:tc>
+                <a:tc>
+                  <a:txBody>
+                    <a:bodyPr/>
+                    <a:lstStyle/>
+                    <a:p>
+                      <a:pPr algn="ctr" fontAlgn="ctr"/>
+                      <a:r>
+                        <a:rPr lang="en-US" sz="1800" dirty="0">
+                          <a:effectLst/>
+                          <a:latin typeface="+mj-lt"/>
+                        </a:rPr>
+                        <a:t>Actual Patient</a:t>
+                      </a:r>
+                    </a:p>
+                  </a:txBody>
+                  <a:tcPr marL="109728" marR="109728" marT="54864" marB="54864" anchor="ctr"/>
+                </a:tc>
+                <a:tc>
+                  <a:txBody>
+                    <a:bodyPr/>
+                    <a:lstStyle/>
+                    <a:p>
+                      <a:pPr algn="ctr" fontAlgn="ctr"/>
+                      <a:r>
+                        <a:rPr lang="en-US" sz="1800" dirty="0">
+                          <a:effectLst/>
+                          <a:latin typeface="+mj-lt"/>
+                        </a:rPr>
+                        <a:t>Predicted Patient</a:t>
+                      </a:r>
+                    </a:p>
+                  </a:txBody>
+                  <a:tcPr marL="109728" marR="109728" marT="54864" marB="54864" anchor="ctr"/>
+                </a:tc>
+                <a:tc>
+                  <a:txBody>
+                    <a:bodyPr/>
+                    <a:lstStyle/>
+                    <a:p>
+                      <a:pPr algn="ctr" fontAlgn="ctr"/>
+                      <a:r>
+                        <a:rPr lang="en-US" sz="1800" dirty="0">
+                          <a:effectLst/>
+                          <a:latin typeface="+mj-lt"/>
+                        </a:rPr>
+                        <a:t>Accuracy</a:t>
+                      </a:r>
+                    </a:p>
+                  </a:txBody>
+                  <a:tcPr marL="109728" marR="109728" marT="54864" marB="54864" anchor="ctr"/>
+                </a:tc>
+                <a:extLst>
+                  <a:ext uri="{0D108BD9-81ED-4DB2-BD59-A6C34878D82A}">
+                    <a16:rowId xmlns:a16="http://schemas.microsoft.com/office/drawing/2014/main" val="2714868485"/>
+                  </a:ext>
+                </a:extLst>
+              </a:tr>
+              <a:tr h="482804">
+                <a:tc>
+                  <a:txBody>
+                    <a:bodyPr/>
+                    <a:lstStyle/>
+                    <a:p>
+                      <a:pPr algn="l" fontAlgn="b"/>
+                      <a:r>
+                        <a:rPr lang="en-US" sz="1800" b="0" i="0" u="none" strike="noStrike" dirty="0">
+                          <a:solidFill>
+                            <a:srgbClr val="000000"/>
+                          </a:solidFill>
+                          <a:effectLst/>
+                          <a:latin typeface="+mn-lt"/>
+                        </a:rPr>
+                        <a:t>Trang</a:t>
+                      </a:r>
+                    </a:p>
+                  </a:txBody>
+                  <a:tcPr marL="6350" marR="6350" marT="6350" marB="0" anchor="b"/>
+                </a:tc>
+                <a:tc>
+                  <a:txBody>
+                    <a:bodyPr/>
+                    <a:lstStyle/>
+                    <a:p>
+                      <a:pPr algn="r" fontAlgn="b"/>
+                      <a:r>
+                        <a:rPr lang="en-US" sz="1800" b="0" i="0" u="none" strike="noStrike">
+                          <a:solidFill>
+                            <a:srgbClr val="000000"/>
+                          </a:solidFill>
+                          <a:effectLst/>
+                          <a:latin typeface="+mn-lt"/>
+                        </a:rPr>
+                        <a:t>2020</a:t>
+                      </a:r>
+                    </a:p>
+                  </a:txBody>
+                  <a:tcPr marL="6350" marR="6350" marT="6350" marB="0" anchor="b"/>
+                </a:tc>
+                <a:tc>
+                  <a:txBody>
+                    <a:bodyPr/>
+                    <a:lstStyle/>
+                    <a:p>
+                      <a:pPr algn="r" fontAlgn="b"/>
+                      <a:r>
+                        <a:rPr lang="en-US" sz="1800" b="0" i="0" u="none" strike="noStrike">
+                          <a:solidFill>
+                            <a:srgbClr val="000000"/>
+                          </a:solidFill>
+                          <a:effectLst/>
+                          <a:latin typeface="+mn-lt"/>
+                        </a:rPr>
+                        <a:t>3211</a:t>
+                      </a:r>
+                    </a:p>
+                  </a:txBody>
+                  <a:tcPr marL="6350" marR="6350" marT="6350" marB="0" anchor="b"/>
+                </a:tc>
+                <a:tc>
+                  <a:txBody>
+                    <a:bodyPr/>
+                    <a:lstStyle/>
+                    <a:p>
+                      <a:pPr algn="r" fontAlgn="b"/>
+                      <a:r>
+                        <a:rPr lang="en-US" sz="1800" b="0" i="0" u="none" strike="noStrike">
+                          <a:solidFill>
+                            <a:srgbClr val="000000"/>
+                          </a:solidFill>
+                          <a:effectLst/>
+                          <a:latin typeface="+mn-lt"/>
+                        </a:rPr>
+                        <a:t>3225.647</a:t>
+                      </a:r>
+                    </a:p>
+                  </a:txBody>
+                  <a:tcPr marL="6350" marR="6350" marT="6350" marB="0" anchor="b"/>
+                </a:tc>
+                <a:tc>
+                  <a:txBody>
+                    <a:bodyPr/>
+                    <a:lstStyle/>
+                    <a:p>
+                      <a:pPr algn="r" fontAlgn="b"/>
+                      <a:r>
+                        <a:rPr lang="en-US" sz="1800" b="0" i="0" u="none" strike="noStrike">
+                          <a:solidFill>
+                            <a:srgbClr val="000000"/>
+                          </a:solidFill>
+                          <a:effectLst/>
+                          <a:latin typeface="+mn-lt"/>
+                        </a:rPr>
+                        <a:t>0.995</a:t>
+                      </a:r>
+                    </a:p>
+                  </a:txBody>
+                  <a:tcPr marL="6350" marR="6350" marT="6350" marB="0" anchor="b"/>
+                </a:tc>
+                <a:extLst>
+                  <a:ext uri="{0D108BD9-81ED-4DB2-BD59-A6C34878D82A}">
+                    <a16:rowId xmlns:a16="http://schemas.microsoft.com/office/drawing/2014/main" val="641258082"/>
+                  </a:ext>
+                </a:extLst>
+              </a:tr>
+              <a:tr h="482804">
+                <a:tc>
+                  <a:txBody>
+                    <a:bodyPr/>
+                    <a:lstStyle/>
+                    <a:p>
+                      <a:pPr algn="l" fontAlgn="b"/>
+                      <a:r>
+                        <a:rPr lang="en-US" sz="1800" b="0" i="0" u="none" strike="noStrike" dirty="0">
+                          <a:solidFill>
+                            <a:srgbClr val="000000"/>
+                          </a:solidFill>
+                          <a:effectLst/>
+                          <a:latin typeface="+mn-lt"/>
+                        </a:rPr>
+                        <a:t>Songkhla</a:t>
+                      </a:r>
+                    </a:p>
+                  </a:txBody>
+                  <a:tcPr marL="6350" marR="6350" marT="6350" marB="0" anchor="b"/>
+                </a:tc>
+                <a:tc>
+                  <a:txBody>
+                    <a:bodyPr/>
+                    <a:lstStyle/>
+                    <a:p>
+                      <a:pPr algn="r" fontAlgn="b"/>
+                      <a:r>
+                        <a:rPr lang="en-US" sz="1800" b="0" i="0" u="none" strike="noStrike" dirty="0">
+                          <a:solidFill>
+                            <a:srgbClr val="000000"/>
+                          </a:solidFill>
+                          <a:effectLst/>
+                          <a:latin typeface="+mn-lt"/>
+                        </a:rPr>
+                        <a:t>2017</a:t>
+                      </a:r>
+                    </a:p>
+                  </a:txBody>
+                  <a:tcPr marL="6350" marR="6350" marT="6350" marB="0" anchor="b"/>
+                </a:tc>
+                <a:tc>
+                  <a:txBody>
+                    <a:bodyPr/>
+                    <a:lstStyle/>
+                    <a:p>
+                      <a:pPr algn="r" fontAlgn="b"/>
+                      <a:r>
+                        <a:rPr lang="en-US" sz="1800" b="0" i="0" u="none" strike="noStrike">
+                          <a:solidFill>
+                            <a:srgbClr val="000000"/>
+                          </a:solidFill>
+                          <a:effectLst/>
+                          <a:latin typeface="+mn-lt"/>
+                        </a:rPr>
+                        <a:t>7314</a:t>
+                      </a:r>
+                    </a:p>
+                  </a:txBody>
+                  <a:tcPr marL="6350" marR="6350" marT="6350" marB="0" anchor="b"/>
+                </a:tc>
+                <a:tc>
+                  <a:txBody>
+                    <a:bodyPr/>
+                    <a:lstStyle/>
+                    <a:p>
+                      <a:pPr algn="r" fontAlgn="b"/>
+                      <a:r>
+                        <a:rPr lang="en-US" sz="1800" b="0" i="0" u="none" strike="noStrike">
+                          <a:solidFill>
+                            <a:srgbClr val="000000"/>
+                          </a:solidFill>
+                          <a:effectLst/>
+                          <a:latin typeface="+mn-lt"/>
+                        </a:rPr>
+                        <a:t>7472.123</a:t>
+                      </a:r>
+                    </a:p>
+                  </a:txBody>
+                  <a:tcPr marL="6350" marR="6350" marT="6350" marB="0" anchor="b"/>
+                </a:tc>
+                <a:tc>
+                  <a:txBody>
+                    <a:bodyPr/>
+                    <a:lstStyle/>
+                    <a:p>
+                      <a:pPr algn="r" fontAlgn="b"/>
+                      <a:r>
+                        <a:rPr lang="en-US" sz="1800" b="0" i="0" u="none" strike="noStrike">
+                          <a:solidFill>
+                            <a:srgbClr val="000000"/>
+                          </a:solidFill>
+                          <a:effectLst/>
+                          <a:latin typeface="+mn-lt"/>
+                        </a:rPr>
+                        <a:t>0.979</a:t>
+                      </a:r>
+                    </a:p>
+                  </a:txBody>
+                  <a:tcPr marL="6350" marR="6350" marT="6350" marB="0" anchor="b"/>
+                </a:tc>
+                <a:extLst>
+                  <a:ext uri="{0D108BD9-81ED-4DB2-BD59-A6C34878D82A}">
+                    <a16:rowId xmlns:a16="http://schemas.microsoft.com/office/drawing/2014/main" val="3302351741"/>
+                  </a:ext>
+                </a:extLst>
+              </a:tr>
+              <a:tr h="482804">
+                <a:tc>
+                  <a:txBody>
+                    <a:bodyPr/>
+                    <a:lstStyle/>
+                    <a:p>
+                      <a:pPr algn="l" fontAlgn="b"/>
+                      <a:r>
+                        <a:rPr lang="en-US" sz="1800" b="0" i="0" u="none" strike="noStrike">
+                          <a:solidFill>
+                            <a:srgbClr val="000000"/>
+                          </a:solidFill>
+                          <a:effectLst/>
+                          <a:latin typeface="+mn-lt"/>
+                        </a:rPr>
+                        <a:t>Nakhon Sri Thammarat</a:t>
+                      </a:r>
+                    </a:p>
+                  </a:txBody>
+                  <a:tcPr marL="6350" marR="6350" marT="6350" marB="0" anchor="b"/>
+                </a:tc>
+                <a:tc>
+                  <a:txBody>
+                    <a:bodyPr/>
+                    <a:lstStyle/>
+                    <a:p>
+                      <a:pPr algn="r" fontAlgn="b"/>
+                      <a:r>
+                        <a:rPr lang="en-US" sz="1800" b="0" i="0" u="none" strike="noStrike">
+                          <a:solidFill>
+                            <a:srgbClr val="000000"/>
+                          </a:solidFill>
+                          <a:effectLst/>
+                          <a:latin typeface="+mn-lt"/>
+                        </a:rPr>
+                        <a:t>2020</a:t>
+                      </a:r>
+                    </a:p>
+                  </a:txBody>
+                  <a:tcPr marL="6350" marR="6350" marT="6350" marB="0" anchor="b"/>
+                </a:tc>
+                <a:tc>
+                  <a:txBody>
+                    <a:bodyPr/>
+                    <a:lstStyle/>
+                    <a:p>
+                      <a:pPr algn="r" fontAlgn="b"/>
+                      <a:r>
+                        <a:rPr lang="en-US" sz="1800" b="0" i="0" u="none" strike="noStrike" dirty="0">
+                          <a:solidFill>
+                            <a:srgbClr val="000000"/>
+                          </a:solidFill>
+                          <a:effectLst/>
+                          <a:latin typeface="+mn-lt"/>
+                        </a:rPr>
+                        <a:t>3419</a:t>
+                      </a:r>
+                    </a:p>
+                  </a:txBody>
+                  <a:tcPr marL="6350" marR="6350" marT="6350" marB="0" anchor="b"/>
+                </a:tc>
+                <a:tc>
+                  <a:txBody>
+                    <a:bodyPr/>
+                    <a:lstStyle/>
+                    <a:p>
+                      <a:pPr algn="r" fontAlgn="b"/>
+                      <a:r>
+                        <a:rPr lang="en-US" sz="1800" b="0" i="0" u="none" strike="noStrike">
+                          <a:solidFill>
+                            <a:srgbClr val="000000"/>
+                          </a:solidFill>
+                          <a:effectLst/>
+                          <a:latin typeface="+mn-lt"/>
+                        </a:rPr>
+                        <a:t>4024.796</a:t>
+                      </a:r>
+                    </a:p>
+                  </a:txBody>
+                  <a:tcPr marL="6350" marR="6350" marT="6350" marB="0" anchor="b"/>
+                </a:tc>
+                <a:tc>
+                  <a:txBody>
+                    <a:bodyPr/>
+                    <a:lstStyle/>
+                    <a:p>
+                      <a:pPr algn="r" fontAlgn="b"/>
+                      <a:r>
+                        <a:rPr lang="en-US" sz="1800" b="0" i="0" u="none" strike="noStrike">
+                          <a:solidFill>
+                            <a:srgbClr val="000000"/>
+                          </a:solidFill>
+                          <a:effectLst/>
+                          <a:latin typeface="+mn-lt"/>
+                        </a:rPr>
+                        <a:t>0.849</a:t>
+                      </a:r>
+                    </a:p>
+                  </a:txBody>
+                  <a:tcPr marL="6350" marR="6350" marT="6350" marB="0" anchor="b"/>
+                </a:tc>
+                <a:extLst>
+                  <a:ext uri="{0D108BD9-81ED-4DB2-BD59-A6C34878D82A}">
+                    <a16:rowId xmlns:a16="http://schemas.microsoft.com/office/drawing/2014/main" val="2641721395"/>
+                  </a:ext>
+                </a:extLst>
+              </a:tr>
+              <a:tr h="811988">
+                <a:tc>
+                  <a:txBody>
+                    <a:bodyPr/>
+                    <a:lstStyle/>
+                    <a:p>
+                      <a:pPr algn="l" fontAlgn="b"/>
+                      <a:r>
+                        <a:rPr lang="en-US" sz="1800" b="0" i="0" u="none" strike="noStrike" dirty="0">
+                          <a:solidFill>
+                            <a:srgbClr val="000000"/>
+                          </a:solidFill>
+                          <a:effectLst/>
+                          <a:latin typeface="+mn-lt"/>
+                        </a:rPr>
+                        <a:t>Kanjanaburi</a:t>
+                      </a:r>
+                    </a:p>
+                  </a:txBody>
+                  <a:tcPr marL="6350" marR="6350" marT="6350" marB="0" anchor="b"/>
+                </a:tc>
+                <a:tc>
+                  <a:txBody>
+                    <a:bodyPr/>
+                    <a:lstStyle/>
+                    <a:p>
+                      <a:pPr algn="r" fontAlgn="b"/>
+                      <a:r>
+                        <a:rPr lang="en-US" sz="1800" b="0" i="0" u="none" strike="noStrike">
+                          <a:solidFill>
+                            <a:srgbClr val="000000"/>
+                          </a:solidFill>
+                          <a:effectLst/>
+                          <a:latin typeface="+mn-lt"/>
+                        </a:rPr>
+                        <a:t>2020</a:t>
+                      </a:r>
+                    </a:p>
+                  </a:txBody>
+                  <a:tcPr marL="6350" marR="6350" marT="6350" marB="0" anchor="b"/>
+                </a:tc>
+                <a:tc>
+                  <a:txBody>
+                    <a:bodyPr/>
+                    <a:lstStyle/>
+                    <a:p>
+                      <a:pPr algn="r" fontAlgn="b"/>
+                      <a:r>
+                        <a:rPr lang="en-US" sz="1800" b="0" i="0" u="none" strike="noStrike" dirty="0">
+                          <a:solidFill>
+                            <a:srgbClr val="000000"/>
+                          </a:solidFill>
+                          <a:effectLst/>
+                          <a:latin typeface="+mn-lt"/>
+                        </a:rPr>
+                        <a:t>1491</a:t>
+                      </a:r>
+                    </a:p>
+                  </a:txBody>
+                  <a:tcPr marL="6350" marR="6350" marT="6350" marB="0" anchor="b"/>
+                </a:tc>
+                <a:tc>
+                  <a:txBody>
+                    <a:bodyPr/>
+                    <a:lstStyle/>
+                    <a:p>
+                      <a:pPr algn="r" fontAlgn="b"/>
+                      <a:r>
+                        <a:rPr lang="en-US" sz="1800" b="0" i="0" u="none" strike="noStrike">
+                          <a:solidFill>
+                            <a:srgbClr val="000000"/>
+                          </a:solidFill>
+                          <a:effectLst/>
+                          <a:latin typeface="+mn-lt"/>
+                        </a:rPr>
+                        <a:t>1769.510</a:t>
+                      </a:r>
+                    </a:p>
+                  </a:txBody>
+                  <a:tcPr marL="6350" marR="6350" marT="6350" marB="0" anchor="b"/>
+                </a:tc>
+                <a:tc>
+                  <a:txBody>
+                    <a:bodyPr/>
+                    <a:lstStyle/>
+                    <a:p>
+                      <a:pPr algn="r" fontAlgn="b"/>
+                      <a:r>
+                        <a:rPr lang="en-US" sz="1800" b="0" i="0" u="none" strike="noStrike">
+                          <a:solidFill>
+                            <a:srgbClr val="000000"/>
+                          </a:solidFill>
+                          <a:effectLst/>
+                          <a:latin typeface="+mn-lt"/>
+                        </a:rPr>
+                        <a:t>0.843</a:t>
+                      </a:r>
+                    </a:p>
+                  </a:txBody>
+                  <a:tcPr marL="6350" marR="6350" marT="6350" marB="0" anchor="b"/>
+                </a:tc>
+                <a:extLst>
+                  <a:ext uri="{0D108BD9-81ED-4DB2-BD59-A6C34878D82A}">
+                    <a16:rowId xmlns:a16="http://schemas.microsoft.com/office/drawing/2014/main" val="2085706532"/>
+                  </a:ext>
+                </a:extLst>
+              </a:tr>
+              <a:tr h="482804">
+                <a:tc>
+                  <a:txBody>
+                    <a:bodyPr/>
+                    <a:lstStyle/>
+                    <a:p>
+                      <a:pPr algn="l" fontAlgn="b"/>
+                      <a:r>
+                        <a:rPr lang="en-US" sz="1800" b="0" i="0" u="none" strike="noStrike">
+                          <a:solidFill>
+                            <a:srgbClr val="000000"/>
+                          </a:solidFill>
+                          <a:effectLst/>
+                          <a:latin typeface="+mn-lt"/>
+                        </a:rPr>
+                        <a:t>Ubon Ratchathani</a:t>
+                      </a:r>
+                    </a:p>
+                  </a:txBody>
+                  <a:tcPr marL="6350" marR="6350" marT="6350" marB="0" anchor="b"/>
+                </a:tc>
+                <a:tc>
+                  <a:txBody>
+                    <a:bodyPr/>
+                    <a:lstStyle/>
+                    <a:p>
+                      <a:pPr algn="r" fontAlgn="b"/>
+                      <a:r>
+                        <a:rPr lang="en-US" sz="1800" b="0" i="0" u="none" strike="noStrike">
+                          <a:solidFill>
+                            <a:srgbClr val="000000"/>
+                          </a:solidFill>
+                          <a:effectLst/>
+                          <a:latin typeface="+mn-lt"/>
+                        </a:rPr>
+                        <a:t>2020</a:t>
+                      </a:r>
+                    </a:p>
+                  </a:txBody>
+                  <a:tcPr marL="6350" marR="6350" marT="6350" marB="0" anchor="b"/>
+                </a:tc>
+                <a:tc>
+                  <a:txBody>
+                    <a:bodyPr/>
+                    <a:lstStyle/>
+                    <a:p>
+                      <a:pPr algn="r" fontAlgn="b"/>
+                      <a:r>
+                        <a:rPr lang="en-US" sz="1800" b="0" i="0" u="none" strike="noStrike" dirty="0">
+                          <a:solidFill>
+                            <a:srgbClr val="000000"/>
+                          </a:solidFill>
+                          <a:effectLst/>
+                          <a:latin typeface="+mn-lt"/>
+                        </a:rPr>
+                        <a:t>2092</a:t>
+                      </a:r>
+                    </a:p>
+                  </a:txBody>
+                  <a:tcPr marL="6350" marR="6350" marT="6350" marB="0" anchor="b"/>
+                </a:tc>
+                <a:tc>
+                  <a:txBody>
+                    <a:bodyPr/>
+                    <a:lstStyle/>
+                    <a:p>
+                      <a:pPr algn="r" fontAlgn="b"/>
+                      <a:r>
+                        <a:rPr lang="en-US" sz="1800" b="0" i="0" u="none" strike="noStrike">
+                          <a:solidFill>
+                            <a:srgbClr val="000000"/>
+                          </a:solidFill>
+                          <a:effectLst/>
+                          <a:latin typeface="+mn-lt"/>
+                        </a:rPr>
+                        <a:t>2635.774</a:t>
+                      </a:r>
+                    </a:p>
+                  </a:txBody>
+                  <a:tcPr marL="6350" marR="6350" marT="6350" marB="0" anchor="b"/>
+                </a:tc>
+                <a:tc>
+                  <a:txBody>
+                    <a:bodyPr/>
+                    <a:lstStyle/>
+                    <a:p>
+                      <a:pPr algn="r" fontAlgn="b"/>
+                      <a:r>
+                        <a:rPr lang="en-US" sz="1800" b="0" i="0" u="none" strike="noStrike">
+                          <a:solidFill>
+                            <a:srgbClr val="000000"/>
+                          </a:solidFill>
+                          <a:effectLst/>
+                          <a:latin typeface="+mn-lt"/>
+                        </a:rPr>
+                        <a:t>0.794</a:t>
+                      </a:r>
+                    </a:p>
+                  </a:txBody>
+                  <a:tcPr marL="6350" marR="6350" marT="6350" marB="0" anchor="b"/>
+                </a:tc>
+                <a:extLst>
+                  <a:ext uri="{0D108BD9-81ED-4DB2-BD59-A6C34878D82A}">
+                    <a16:rowId xmlns:a16="http://schemas.microsoft.com/office/drawing/2014/main" val="495392126"/>
+                  </a:ext>
+                </a:extLst>
+              </a:tr>
+              <a:tr h="482804">
+                <a:tc>
+                  <a:txBody>
+                    <a:bodyPr/>
+                    <a:lstStyle/>
+                    <a:p>
+                      <a:pPr algn="l" fontAlgn="b"/>
+                      <a:r>
+                        <a:rPr lang="en-US" sz="1800" b="0" i="0" u="none" strike="noStrike">
+                          <a:solidFill>
+                            <a:srgbClr val="000000"/>
+                          </a:solidFill>
+                          <a:effectLst/>
+                          <a:latin typeface="+mn-lt"/>
+                        </a:rPr>
+                        <a:t>Nakhon Ratchasima</a:t>
+                      </a:r>
+                    </a:p>
+                  </a:txBody>
+                  <a:tcPr marL="6350" marR="6350" marT="6350" marB="0" anchor="b"/>
+                </a:tc>
+                <a:tc>
+                  <a:txBody>
+                    <a:bodyPr/>
+                    <a:lstStyle/>
+                    <a:p>
+                      <a:pPr algn="r" fontAlgn="b"/>
+                      <a:r>
+                        <a:rPr lang="en-US" sz="1800" b="0" i="0" u="none" strike="noStrike">
+                          <a:solidFill>
+                            <a:srgbClr val="000000"/>
+                          </a:solidFill>
+                          <a:effectLst/>
+                          <a:latin typeface="+mn-lt"/>
+                        </a:rPr>
+                        <a:t>2016</a:t>
+                      </a:r>
+                    </a:p>
+                  </a:txBody>
+                  <a:tcPr marL="6350" marR="6350" marT="6350" marB="0" anchor="b"/>
+                </a:tc>
+                <a:tc>
+                  <a:txBody>
+                    <a:bodyPr/>
+                    <a:lstStyle/>
+                    <a:p>
+                      <a:pPr algn="r" fontAlgn="b"/>
+                      <a:r>
+                        <a:rPr lang="en-US" sz="1800" b="0" i="0" u="none" strike="noStrike">
+                          <a:solidFill>
+                            <a:srgbClr val="000000"/>
+                          </a:solidFill>
+                          <a:effectLst/>
+                          <a:latin typeface="+mn-lt"/>
+                        </a:rPr>
+                        <a:t>7194</a:t>
+                      </a:r>
+                    </a:p>
+                  </a:txBody>
+                  <a:tcPr marL="6350" marR="6350" marT="6350" marB="0" anchor="b"/>
+                </a:tc>
+                <a:tc>
+                  <a:txBody>
+                    <a:bodyPr/>
+                    <a:lstStyle/>
+                    <a:p>
+                      <a:pPr algn="r" fontAlgn="b"/>
+                      <a:r>
+                        <a:rPr lang="en-US" sz="1800" b="0" i="0" u="none" strike="noStrike">
+                          <a:solidFill>
+                            <a:srgbClr val="000000"/>
+                          </a:solidFill>
+                          <a:effectLst/>
+                          <a:latin typeface="+mn-lt"/>
+                        </a:rPr>
+                        <a:t>9131.089</a:t>
+                      </a:r>
+                    </a:p>
+                  </a:txBody>
+                  <a:tcPr marL="6350" marR="6350" marT="6350" marB="0" anchor="b"/>
+                </a:tc>
+                <a:tc>
+                  <a:txBody>
+                    <a:bodyPr/>
+                    <a:lstStyle/>
+                    <a:p>
+                      <a:pPr algn="r" fontAlgn="b"/>
+                      <a:r>
+                        <a:rPr lang="en-US" sz="1800" b="0" i="0" u="none" strike="noStrike" dirty="0">
+                          <a:solidFill>
+                            <a:srgbClr val="000000"/>
+                          </a:solidFill>
+                          <a:effectLst/>
+                          <a:latin typeface="+mn-lt"/>
+                        </a:rPr>
+                        <a:t>0.788</a:t>
+                      </a:r>
+                    </a:p>
+                  </a:txBody>
+                  <a:tcPr marL="6350" marR="6350" marT="6350" marB="0" anchor="b"/>
+                </a:tc>
+                <a:extLst>
+                  <a:ext uri="{0D108BD9-81ED-4DB2-BD59-A6C34878D82A}">
+                    <a16:rowId xmlns:a16="http://schemas.microsoft.com/office/drawing/2014/main" val="1094402251"/>
+                  </a:ext>
+                </a:extLst>
+              </a:tr>
+            </a:tbl>
+          </a:graphicData>
+        </a:graphic>
+      </p:graphicFrame>
     </p:spTree>
     <p:extLst>
       <p:ext uri="{BB962C8B-B14F-4D97-AF65-F5344CB8AC3E}">
@@ -9315,7 +9298,7 @@
 </p:sld>
 </file>
 
-<file path=ppt/slides/slide16.xml><?xml version="1.0" encoding="utf-8"?>
+<file path=ppt/slides/slide18.xml><?xml version="1.0" encoding="utf-8"?>
 <p:sld xmlns:a="http://schemas.openxmlformats.org/drawingml/2006/main" xmlns:r="http://schemas.openxmlformats.org/officeDocument/2006/relationships" xmlns:p="http://schemas.openxmlformats.org/presentationml/2006/main">
   <p:cSld>
     <p:spTree>
@@ -9425,7 +9408,101 @@
 </p:sld>
 </file>
 
-<file path=ppt/slides/slide17.xml><?xml version="1.0" encoding="utf-8"?>
+<file path=ppt/slides/slide19.xml><?xml version="1.0" encoding="utf-8"?>
+<p:sld xmlns:a="http://schemas.openxmlformats.org/drawingml/2006/main" xmlns:r="http://schemas.openxmlformats.org/officeDocument/2006/relationships" xmlns:p="http://schemas.openxmlformats.org/presentationml/2006/main">
+  <p:cSld>
+    <p:spTree>
+      <p:nvGrpSpPr>
+        <p:cNvPr id="1" name=""/>
+        <p:cNvGrpSpPr/>
+        <p:nvPr/>
+      </p:nvGrpSpPr>
+      <p:grpSpPr>
+        <a:xfrm>
+          <a:off x="0" y="0"/>
+          <a:ext cx="0" cy="0"/>
+          <a:chOff x="0" y="0"/>
+          <a:chExt cx="0" cy="0"/>
+        </a:xfrm>
+      </p:grpSpPr>
+      <p:sp>
+        <p:nvSpPr>
+          <p:cNvPr id="2" name="Title 1">
+            <a:extLst>
+              <a:ext uri="{FF2B5EF4-FFF2-40B4-BE49-F238E27FC236}">
+                <a16:creationId xmlns:a16="http://schemas.microsoft.com/office/drawing/2014/main" id="{B0DB5CBE-DFFA-4432-92F8-5639FE300EE5}"/>
+              </a:ext>
+            </a:extLst>
+          </p:cNvPr>
+          <p:cNvSpPr>
+            <a:spLocks noGrp="1"/>
+          </p:cNvSpPr>
+          <p:nvPr>
+            <p:ph type="title"/>
+          </p:nvPr>
+        </p:nvSpPr>
+        <p:spPr>
+          <a:xfrm>
+            <a:off x="838200" y="317500"/>
+            <a:ext cx="10515600" cy="1325563"/>
+          </a:xfrm>
+        </p:spPr>
+        <p:txBody>
+          <a:bodyPr/>
+          <a:lstStyle/>
+          <a:p>
+            <a:r>
+              <a:rPr lang="en-US" dirty="0"/>
+              <a:t>Rain fall</a:t>
+            </a:r>
+          </a:p>
+        </p:txBody>
+      </p:sp>
+      <p:graphicFrame>
+        <p:nvGraphicFramePr>
+          <p:cNvPr id="8" name="Content Placeholder 7">
+            <a:extLst>
+              <a:ext uri="{FF2B5EF4-FFF2-40B4-BE49-F238E27FC236}">
+                <a16:creationId xmlns:a16="http://schemas.microsoft.com/office/drawing/2014/main" id="{BFD04B86-82A4-4621-BC6E-210F5B24D833}"/>
+              </a:ext>
+            </a:extLst>
+          </p:cNvPr>
+          <p:cNvGraphicFramePr>
+            <a:graphicFrameLocks noGrp="1"/>
+          </p:cNvGraphicFramePr>
+          <p:nvPr>
+            <p:ph idx="1"/>
+            <p:extLst>
+              <p:ext uri="{D42A27DB-BD31-4B8C-83A1-F6EECF244321}">
+                <p14:modId xmlns:p14="http://schemas.microsoft.com/office/powerpoint/2010/main" val="1317073714"/>
+              </p:ext>
+            </p:extLst>
+          </p:nvPr>
+        </p:nvGraphicFramePr>
+        <p:xfrm>
+          <a:off x="838200" y="1825625"/>
+          <a:ext cx="10515600" cy="4351338"/>
+        </p:xfrm>
+        <a:graphic>
+          <a:graphicData uri="http://schemas.openxmlformats.org/drawingml/2006/chart">
+            <c:chart xmlns:c="http://schemas.openxmlformats.org/drawingml/2006/chart" xmlns:r="http://schemas.openxmlformats.org/officeDocument/2006/relationships" r:id="rId2"/>
+          </a:graphicData>
+        </a:graphic>
+      </p:graphicFrame>
+    </p:spTree>
+    <p:extLst>
+      <p:ext uri="{BB962C8B-B14F-4D97-AF65-F5344CB8AC3E}">
+        <p14:creationId xmlns:p14="http://schemas.microsoft.com/office/powerpoint/2010/main" val="127837137"/>
+      </p:ext>
+    </p:extLst>
+  </p:cSld>
+  <p:clrMapOvr>
+    <a:masterClrMapping/>
+  </p:clrMapOvr>
+</p:sld>
+</file>
+
+<file path=ppt/slides/slide2.xml><?xml version="1.0" encoding="utf-8"?>
 <p:sld xmlns:a="http://schemas.openxmlformats.org/drawingml/2006/main" xmlns:r="http://schemas.openxmlformats.org/officeDocument/2006/relationships" xmlns:p="http://schemas.openxmlformats.org/presentationml/2006/main">
   <p:cSld>
     <p:spTree>
@@ -9465,46 +9542,122 @@
           <a:p>
             <a:r>
               <a:rPr lang="en-US" dirty="0"/>
-              <a:t>Rain fall</a:t>
+              <a:t>Overview</a:t>
             </a:r>
           </a:p>
         </p:txBody>
       </p:sp>
-      <p:graphicFrame>
-        <p:nvGraphicFramePr>
-          <p:cNvPr id="24" name="Content Placeholder 23">
+      <p:sp>
+        <p:nvSpPr>
+          <p:cNvPr id="3" name="Content Placeholder 2">
             <a:extLst>
               <a:ext uri="{FF2B5EF4-FFF2-40B4-BE49-F238E27FC236}">
-                <a16:creationId xmlns:a16="http://schemas.microsoft.com/office/drawing/2014/main" id="{417523C1-FC67-4DFF-9443-0BE7AE37BA8A}"/>
+                <a16:creationId xmlns:a16="http://schemas.microsoft.com/office/drawing/2014/main" id="{D6497D47-5F29-4EDD-853A-BFE2A01FF6FF}"/>
               </a:ext>
             </a:extLst>
           </p:cNvPr>
-          <p:cNvGraphicFramePr>
-            <a:graphicFrameLocks noGrp="1"/>
-          </p:cNvGraphicFramePr>
+          <p:cNvSpPr>
+            <a:spLocks noGrp="1"/>
+          </p:cNvSpPr>
           <p:nvPr>
             <p:ph idx="1"/>
-            <p:extLst>
-              <p:ext uri="{D42A27DB-BD31-4B8C-83A1-F6EECF244321}">
-                <p14:modId xmlns:p14="http://schemas.microsoft.com/office/powerpoint/2010/main" val="3820269114"/>
-              </p:ext>
-            </p:extLst>
           </p:nvPr>
-        </p:nvGraphicFramePr>
-        <p:xfrm>
-          <a:off x="838200" y="1825625"/>
-          <a:ext cx="10515600" cy="4351338"/>
-        </p:xfrm>
-        <a:graphic>
-          <a:graphicData uri="http://schemas.openxmlformats.org/drawingml/2006/chart">
-            <c:chart xmlns:c="http://schemas.openxmlformats.org/drawingml/2006/chart" xmlns:r="http://schemas.openxmlformats.org/officeDocument/2006/relationships" r:id="rId2"/>
-          </a:graphicData>
-        </a:graphic>
-      </p:graphicFrame>
+        </p:nvSpPr>
+        <p:spPr/>
+        <p:txBody>
+          <a:bodyPr>
+            <a:normAutofit/>
+          </a:bodyPr>
+          <a:lstStyle/>
+          <a:p>
+            <a:r>
+              <a:rPr lang="en-US" dirty="0"/>
+              <a:t>Key facts</a:t>
+            </a:r>
+          </a:p>
+          <a:p>
+            <a:pPr marL="457200" lvl="1" indent="0">
+              <a:buNone/>
+            </a:pPr>
+            <a:r>
+              <a:rPr lang="en-US" dirty="0"/>
+              <a:t>⚠ The infection causes flu-like illness, and occasionally develops into a potentially lethal.</a:t>
+            </a:r>
+            <a:endParaRPr lang="en-US" dirty="0">
+              <a:latin typeface="Times New Roman" panose="02020603050405020304" pitchFamily="18" charset="0"/>
+              <a:cs typeface="Times New Roman" panose="02020603050405020304" pitchFamily="18" charset="0"/>
+            </a:endParaRPr>
+          </a:p>
+          <a:p>
+            <a:pPr marL="457200" lvl="1" indent="0">
+              <a:buNone/>
+            </a:pPr>
+            <a:r>
+              <a:rPr lang="en-US" dirty="0"/>
+              <a:t>⚠</a:t>
+            </a:r>
+            <a:r>
+              <a:rPr lang="en-US" b="0" i="0" dirty="0">
+                <a:effectLst/>
+              </a:rPr>
+              <a:t> There is no specific treatment for dengue, </a:t>
+            </a:r>
+            <a:r>
+              <a:rPr lang="en-US" b="0" dirty="0">
+                <a:effectLst/>
+                <a:latin typeface="+mj-lt"/>
+              </a:rPr>
+              <a:t>but early detection and access to proper medical care </a:t>
+            </a:r>
+            <a:r>
+              <a:rPr lang="en-US" b="0" i="0" dirty="0">
+                <a:effectLst/>
+              </a:rPr>
+              <a:t>lowers fatality rates below 1%.</a:t>
+            </a:r>
+            <a:endParaRPr lang="en-US" sz="1600" dirty="0">
+              <a:latin typeface="Times New Roman" panose="02020603050405020304" pitchFamily="18" charset="0"/>
+              <a:cs typeface="Times New Roman" panose="02020603050405020304" pitchFamily="18" charset="0"/>
+            </a:endParaRPr>
+          </a:p>
+          <a:p>
+            <a:r>
+              <a:rPr lang="en-US" dirty="0"/>
+              <a:t>Objectives</a:t>
+            </a:r>
+          </a:p>
+          <a:p>
+            <a:pPr marL="457200" lvl="1" indent="0">
+              <a:buNone/>
+            </a:pPr>
+            <a:r>
+              <a:rPr lang="en-US" dirty="0"/>
+              <a:t>🔮 To predict the number of</a:t>
+            </a:r>
+            <a:r>
+              <a:rPr lang="th-TH" dirty="0"/>
+              <a:t> </a:t>
+            </a:r>
+            <a:r>
+              <a:rPr lang="en-US" dirty="0"/>
+              <a:t>patients by temperature, rainfall, humidity.</a:t>
+            </a:r>
+          </a:p>
+          <a:p>
+            <a:pPr marL="457200" lvl="1" indent="0">
+              <a:buNone/>
+            </a:pPr>
+            <a:r>
+              <a:rPr lang="en-US" dirty="0"/>
+              <a:t>📊 To visualize information that is relevant to the data.</a:t>
+            </a:r>
+          </a:p>
+        </p:txBody>
+      </p:sp>
     </p:spTree>
     <p:extLst>
       <p:ext uri="{BB962C8B-B14F-4D97-AF65-F5344CB8AC3E}">
-        <p14:creationId xmlns:p14="http://schemas.microsoft.com/office/powerpoint/2010/main" val="127837137"/>
+        <p14:creationId xmlns:p14="http://schemas.microsoft.com/office/powerpoint/2010/main" val="2549193430"/>
       </p:ext>
     </p:extLst>
   </p:cSld>
@@ -9514,7 +9667,7 @@
 </p:sld>
 </file>
 
-<file path=ppt/slides/slide18.xml><?xml version="1.0" encoding="utf-8"?>
+<file path=ppt/slides/slide20.xml><?xml version="1.0" encoding="utf-8"?>
 <p:sld xmlns:a="http://schemas.openxmlformats.org/drawingml/2006/main" xmlns:r="http://schemas.openxmlformats.org/officeDocument/2006/relationships" xmlns:p="http://schemas.openxmlformats.org/presentationml/2006/main">
   <p:cSld>
     <p:spTree>
@@ -9942,7 +10095,7 @@
 </p:sld>
 </file>
 
-<file path=ppt/slides/slide19.xml><?xml version="1.0" encoding="utf-8"?>
+<file path=ppt/slides/slide21.xml><?xml version="1.0" encoding="utf-8"?>
 <p:sld xmlns:a="http://schemas.openxmlformats.org/drawingml/2006/main" xmlns:r="http://schemas.openxmlformats.org/officeDocument/2006/relationships" xmlns:p="http://schemas.openxmlformats.org/presentationml/2006/main">
   <p:cSld>
     <p:bg>
@@ -9967,126 +10120,6 @@
           <a:chExt cx="0" cy="0"/>
         </a:xfrm>
       </p:grpSpPr>
-      <p:pic>
-        <p:nvPicPr>
-          <p:cNvPr id="1026" name="Picture 2" descr="บิ๊กตู่&amp;#39; แถลงการณ์ ลั่นไทยต้องชนะ วอนอย่ากักตุน-วิตกเกินเหตุ ชี้ไม่มีอาการ  ไม่ต้องไปตรวจ">
-            <a:extLst>
-              <a:ext uri="{FF2B5EF4-FFF2-40B4-BE49-F238E27FC236}">
-                <a16:creationId xmlns:a16="http://schemas.microsoft.com/office/drawing/2014/main" id="{CBBEDEDD-2275-4D12-AE44-93C96E5E2E6F}"/>
-              </a:ext>
-            </a:extLst>
-          </p:cNvPr>
-          <p:cNvPicPr>
-            <a:picLocks noChangeAspect="1" noChangeArrowheads="1"/>
-          </p:cNvPicPr>
-          <p:nvPr/>
-        </p:nvPicPr>
-        <p:blipFill rotWithShape="1">
-          <a:blip r:embed="rId2">
-            <a:alphaModFix amt="30000"/>
-            <a:extLst>
-              <a:ext uri="{28A0092B-C50C-407E-A947-70E740481C1C}">
-                <a14:useLocalDpi xmlns:a14="http://schemas.microsoft.com/office/drawing/2010/main" val="0"/>
-              </a:ext>
-            </a:extLst>
-          </a:blip>
-          <a:srcRect l="19139" t="18410" r="19137" b="19867"/>
-          <a:stretch/>
-        </p:blipFill>
-        <p:spPr bwMode="auto">
-          <a:xfrm>
-            <a:off x="0" y="-1"/>
-            <a:ext cx="12192000" cy="6858001"/>
-          </a:xfrm>
-          <a:prstGeom prst="rect">
-            <a:avLst/>
-          </a:prstGeom>
-          <a:noFill/>
-          <a:extLst>
-            <a:ext uri="{909E8E84-426E-40DD-AFC4-6F175D3DCCD1}">
-              <a14:hiddenFill xmlns:a14="http://schemas.microsoft.com/office/drawing/2010/main">
-                <a:solidFill>
-                  <a:srgbClr val="FFFFFF"/>
-                </a:solidFill>
-              </a14:hiddenFill>
-            </a:ext>
-          </a:extLst>
-        </p:spPr>
-      </p:pic>
-      <p:sp>
-        <p:nvSpPr>
-          <p:cNvPr id="3" name="Rectangle 2">
-            <a:extLst>
-              <a:ext uri="{FF2B5EF4-FFF2-40B4-BE49-F238E27FC236}">
-                <a16:creationId xmlns:a16="http://schemas.microsoft.com/office/drawing/2014/main" id="{062835F2-3546-4248-9C60-D63A8BEEAEFE}"/>
-              </a:ext>
-            </a:extLst>
-          </p:cNvPr>
-          <p:cNvSpPr/>
-          <p:nvPr/>
-        </p:nvSpPr>
-        <p:spPr>
-          <a:xfrm>
-            <a:off x="0" y="0"/>
-            <a:ext cx="12192000" cy="4649002"/>
-          </a:xfrm>
-          <a:prstGeom prst="rect">
-            <a:avLst/>
-          </a:prstGeom>
-          <a:gradFill>
-            <a:gsLst>
-              <a:gs pos="0">
-                <a:schemeClr val="accent1">
-                  <a:lumMod val="5000"/>
-                  <a:lumOff val="95000"/>
-                  <a:alpha val="29000"/>
-                </a:schemeClr>
-              </a:gs>
-              <a:gs pos="61000">
-                <a:schemeClr val="bg1"/>
-              </a:gs>
-              <a:gs pos="83000">
-                <a:schemeClr val="bg1">
-                  <a:alpha val="78000"/>
-                </a:schemeClr>
-              </a:gs>
-              <a:gs pos="100000">
-                <a:schemeClr val="bg1">
-                  <a:alpha val="42000"/>
-                </a:schemeClr>
-              </a:gs>
-            </a:gsLst>
-            <a:lin ang="5400000" scaled="1"/>
-          </a:gradFill>
-          <a:ln>
-            <a:noFill/>
-          </a:ln>
-        </p:spPr>
-        <p:style>
-          <a:lnRef idx="2">
-            <a:schemeClr val="accent1">
-              <a:shade val="50000"/>
-            </a:schemeClr>
-          </a:lnRef>
-          <a:fillRef idx="1">
-            <a:schemeClr val="accent1"/>
-          </a:fillRef>
-          <a:effectRef idx="0">
-            <a:schemeClr val="accent1"/>
-          </a:effectRef>
-          <a:fontRef idx="minor">
-            <a:schemeClr val="lt1"/>
-          </a:fontRef>
-        </p:style>
-        <p:txBody>
-          <a:bodyPr rtlCol="0" anchor="ctr"/>
-          <a:lstStyle/>
-          <a:p>
-            <a:pPr algn="ctr"/>
-            <a:endParaRPr lang="en-US"/>
-          </a:p>
-        </p:txBody>
-      </p:sp>
       <p:sp>
         <p:nvSpPr>
           <p:cNvPr id="2" name="Title 1">
@@ -10170,171 +10203,6 @@
     <p:extLst>
       <p:ext uri="{BB962C8B-B14F-4D97-AF65-F5344CB8AC3E}">
         <p14:creationId xmlns:p14="http://schemas.microsoft.com/office/powerpoint/2010/main" val="596697024"/>
-      </p:ext>
-    </p:extLst>
-  </p:cSld>
-  <p:clrMapOvr>
-    <a:masterClrMapping/>
-  </p:clrMapOvr>
-</p:sld>
-</file>
-
-<file path=ppt/slides/slide2.xml><?xml version="1.0" encoding="utf-8"?>
-<p:sld xmlns:a="http://schemas.openxmlformats.org/drawingml/2006/main" xmlns:r="http://schemas.openxmlformats.org/officeDocument/2006/relationships" xmlns:p="http://schemas.openxmlformats.org/presentationml/2006/main">
-  <p:cSld>
-    <p:spTree>
-      <p:nvGrpSpPr>
-        <p:cNvPr id="1" name=""/>
-        <p:cNvGrpSpPr/>
-        <p:nvPr/>
-      </p:nvGrpSpPr>
-      <p:grpSpPr>
-        <a:xfrm>
-          <a:off x="0" y="0"/>
-          <a:ext cx="0" cy="0"/>
-          <a:chOff x="0" y="0"/>
-          <a:chExt cx="0" cy="0"/>
-        </a:xfrm>
-      </p:grpSpPr>
-      <p:sp>
-        <p:nvSpPr>
-          <p:cNvPr id="2" name="Title 1">
-            <a:extLst>
-              <a:ext uri="{FF2B5EF4-FFF2-40B4-BE49-F238E27FC236}">
-                <a16:creationId xmlns:a16="http://schemas.microsoft.com/office/drawing/2014/main" id="{B0DB5CBE-DFFA-4432-92F8-5639FE300EE5}"/>
-              </a:ext>
-            </a:extLst>
-          </p:cNvPr>
-          <p:cNvSpPr>
-            <a:spLocks noGrp="1"/>
-          </p:cNvSpPr>
-          <p:nvPr>
-            <p:ph type="title"/>
-          </p:nvPr>
-        </p:nvSpPr>
-        <p:spPr/>
-        <p:txBody>
-          <a:bodyPr/>
-          <a:lstStyle/>
-          <a:p>
-            <a:r>
-              <a:rPr lang="en-US" dirty="0"/>
-              <a:t>Overview</a:t>
-            </a:r>
-          </a:p>
-        </p:txBody>
-      </p:sp>
-      <p:sp>
-        <p:nvSpPr>
-          <p:cNvPr id="3" name="Content Placeholder 2">
-            <a:extLst>
-              <a:ext uri="{FF2B5EF4-FFF2-40B4-BE49-F238E27FC236}">
-                <a16:creationId xmlns:a16="http://schemas.microsoft.com/office/drawing/2014/main" id="{D6497D47-5F29-4EDD-853A-BFE2A01FF6FF}"/>
-              </a:ext>
-            </a:extLst>
-          </p:cNvPr>
-          <p:cNvSpPr>
-            <a:spLocks noGrp="1"/>
-          </p:cNvSpPr>
-          <p:nvPr>
-            <p:ph idx="1"/>
-          </p:nvPr>
-        </p:nvSpPr>
-        <p:spPr/>
-        <p:txBody>
-          <a:bodyPr>
-            <a:normAutofit/>
-          </a:bodyPr>
-          <a:lstStyle/>
-          <a:p>
-            <a:r>
-              <a:rPr lang="en-US" dirty="0"/>
-              <a:t>Key facts</a:t>
-            </a:r>
-          </a:p>
-          <a:p>
-            <a:pPr marL="457200" lvl="1" indent="0">
-              <a:buNone/>
-            </a:pPr>
-            <a:r>
-              <a:rPr lang="en-US" dirty="0"/>
-              <a:t>⚠ The infection causes flu-like illness, and occasionally develops into a potentially lethal.</a:t>
-            </a:r>
-            <a:endParaRPr lang="en-US" dirty="0">
-              <a:latin typeface="Times New Roman" panose="02020603050405020304" pitchFamily="18" charset="0"/>
-              <a:cs typeface="Times New Roman" panose="02020603050405020304" pitchFamily="18" charset="0"/>
-            </a:endParaRPr>
-          </a:p>
-          <a:p>
-            <a:pPr marL="457200" lvl="1" indent="0">
-              <a:buNone/>
-            </a:pPr>
-            <a:r>
-              <a:rPr lang="en-US" dirty="0"/>
-              <a:t>⚠</a:t>
-            </a:r>
-            <a:r>
-              <a:rPr lang="en-US" b="0" i="0" dirty="0">
-                <a:effectLst/>
-              </a:rPr>
-              <a:t> There is no specific treatment for dengue, </a:t>
-            </a:r>
-            <a:r>
-              <a:rPr lang="en-US" b="0" dirty="0">
-                <a:effectLst/>
-                <a:latin typeface="+mj-lt"/>
-              </a:rPr>
-              <a:t>but early detection and access to proper medical care </a:t>
-            </a:r>
-            <a:r>
-              <a:rPr lang="en-US" b="0" i="0" dirty="0">
-                <a:effectLst/>
-              </a:rPr>
-              <a:t>lowers fatality rates below 1%.</a:t>
-            </a:r>
-            <a:endParaRPr lang="en-US" sz="1600" dirty="0">
-              <a:latin typeface="Times New Roman" panose="02020603050405020304" pitchFamily="18" charset="0"/>
-              <a:cs typeface="Times New Roman" panose="02020603050405020304" pitchFamily="18" charset="0"/>
-            </a:endParaRPr>
-          </a:p>
-          <a:p>
-            <a:r>
-              <a:rPr lang="en-US" dirty="0"/>
-              <a:t>Objectives</a:t>
-            </a:r>
-          </a:p>
-          <a:p>
-            <a:pPr marL="457200" lvl="1" indent="0">
-              <a:buNone/>
-            </a:pPr>
-            <a:r>
-              <a:rPr lang="en-US" dirty="0"/>
-              <a:t>🔮 To predict the number of</a:t>
-            </a:r>
-            <a:r>
-              <a:rPr lang="th-TH" dirty="0"/>
-              <a:t> </a:t>
-            </a:r>
-            <a:r>
-              <a:rPr lang="en-US" dirty="0"/>
-              <a:t>patients by temperature, rainfall, humidity.</a:t>
-            </a:r>
-          </a:p>
-          <a:p>
-            <a:pPr marL="457200" lvl="1" indent="0">
-              <a:buNone/>
-            </a:pPr>
-            <a:r>
-              <a:rPr lang="en-US" dirty="0"/>
-              <a:t>📊 To visualize information that is relevant to the data.</a:t>
-            </a:r>
-          </a:p>
-        </p:txBody>
-      </p:sp>
-    </p:spTree>
-    <p:extLst>
-      <p:ext uri="{BB962C8B-B14F-4D97-AF65-F5344CB8AC3E}">
-        <p14:creationId xmlns:p14="http://schemas.microsoft.com/office/powerpoint/2010/main" val="2549193430"/>
       </p:ext>
     </p:extLst>
   </p:cSld>
@@ -10781,7 +10649,7 @@
           <a:p>
             <a:r>
               <a:rPr lang="en-US" sz="4000" dirty="0"/>
-              <a:t>Temperature 🌡</a:t>
+              <a:t>Temperature</a:t>
             </a:r>
           </a:p>
         </p:txBody>
@@ -10899,42 +10767,43 @@
           <a:p>
             <a:r>
               <a:rPr lang="en-US" dirty="0"/>
-              <a:t>Rainfall</a:t>
+              <a:t>Rainfall 🌧</a:t>
             </a:r>
           </a:p>
         </p:txBody>
       </p:sp>
-      <p:graphicFrame>
-        <p:nvGraphicFramePr>
-          <p:cNvPr id="24" name="Content Placeholder 23">
+      <p:pic>
+        <p:nvPicPr>
+          <p:cNvPr id="16" name="Content Placeholder 15">
             <a:extLst>
               <a:ext uri="{FF2B5EF4-FFF2-40B4-BE49-F238E27FC236}">
-                <a16:creationId xmlns:a16="http://schemas.microsoft.com/office/drawing/2014/main" id="{417523C1-FC67-4DFF-9443-0BE7AE37BA8A}"/>
+                <a16:creationId xmlns:a16="http://schemas.microsoft.com/office/drawing/2014/main" id="{FAE2D146-BC5E-43C9-AEBE-0FAF0F2AD26E}"/>
               </a:ext>
             </a:extLst>
           </p:cNvPr>
-          <p:cNvGraphicFramePr>
-            <a:graphicFrameLocks noGrp="1"/>
-          </p:cNvGraphicFramePr>
+          <p:cNvPicPr>
+            <a:picLocks noGrp="1" noChangeAspect="1"/>
+          </p:cNvPicPr>
           <p:nvPr>
             <p:ph idx="1"/>
-            <p:extLst>
-              <p:ext uri="{D42A27DB-BD31-4B8C-83A1-F6EECF244321}">
-                <p14:modId xmlns:p14="http://schemas.microsoft.com/office/powerpoint/2010/main" val="2084959747"/>
-              </p:ext>
-            </p:extLst>
           </p:nvPr>
-        </p:nvGraphicFramePr>
-        <p:xfrm>
-          <a:off x="838200" y="1825625"/>
-          <a:ext cx="10515600" cy="4351338"/>
-        </p:xfrm>
-        <a:graphic>
-          <a:graphicData uri="http://schemas.openxmlformats.org/drawingml/2006/chart">
-            <c:chart xmlns:c="http://schemas.openxmlformats.org/drawingml/2006/chart" xmlns:r="http://schemas.openxmlformats.org/officeDocument/2006/relationships" r:id="rId2"/>
-          </a:graphicData>
-        </a:graphic>
-      </p:graphicFrame>
+        </p:nvPicPr>
+        <p:blipFill>
+          <a:blip r:embed="rId2"/>
+          <a:stretch>
+            <a:fillRect/>
+          </a:stretch>
+        </p:blipFill>
+        <p:spPr>
+          <a:xfrm>
+            <a:off x="839657" y="1825625"/>
+            <a:ext cx="10512686" cy="4351338"/>
+          </a:xfrm>
+          <a:prstGeom prst="rect">
+            <a:avLst/>
+          </a:prstGeom>
+        </p:spPr>
+      </p:pic>
     </p:spTree>
     <p:extLst>
       <p:ext uri="{BB962C8B-B14F-4D97-AF65-F5344CB8AC3E}">

</xml_diff>